<commit_message>
Adding demo to slides, as well as summary page
</commit_message>
<xml_diff>
--- a/Day1/intro_to_git.pptx
+++ b/Day1/intro_to_git.pptx
@@ -4,18 +4,22 @@
   <p:sldMasterIdLst>
     <p:sldMasterId id="2147483648" r:id="rId1"/>
   </p:sldMasterIdLst>
+  <p:notesMasterIdLst>
+    <p:notesMasterId r:id="rId14"/>
+  </p:notesMasterIdLst>
   <p:sldIdLst>
     <p:sldId id="256" r:id="rId2"/>
     <p:sldId id="278" r:id="rId3"/>
     <p:sldId id="257" r:id="rId4"/>
-    <p:sldId id="279" r:id="rId5"/>
-    <p:sldId id="283" r:id="rId6"/>
-    <p:sldId id="280" r:id="rId7"/>
-    <p:sldId id="281" r:id="rId8"/>
-    <p:sldId id="282" r:id="rId9"/>
-    <p:sldId id="285" r:id="rId10"/>
-    <p:sldId id="287" r:id="rId11"/>
-    <p:sldId id="286" r:id="rId12"/>
+    <p:sldId id="283" r:id="rId5"/>
+    <p:sldId id="258" r:id="rId6"/>
+    <p:sldId id="289" r:id="rId7"/>
+    <p:sldId id="280" r:id="rId8"/>
+    <p:sldId id="281" r:id="rId9"/>
+    <p:sldId id="282" r:id="rId10"/>
+    <p:sldId id="285" r:id="rId11"/>
+    <p:sldId id="287" r:id="rId12"/>
+    <p:sldId id="286" r:id="rId13"/>
   </p:sldIdLst>
   <p:sldSz cx="12192000" cy="6858000"/>
   <p:notesSz cx="6858000" cy="9144000"/>
@@ -120,6 +124,464 @@
     </p:ext>
   </p:extLst>
 </p:presentation>
+</file>
+
+<file path=ppt/notesMasters/notesMaster1.xml><?xml version="1.0" encoding="utf-8"?>
+<p:notesMaster xmlns:a="http://schemas.openxmlformats.org/drawingml/2006/main" xmlns:r="http://schemas.openxmlformats.org/officeDocument/2006/relationships" xmlns:p="http://schemas.openxmlformats.org/presentationml/2006/main">
+  <p:cSld>
+    <p:bg>
+      <p:bgRef idx="1001">
+        <a:schemeClr val="bg1"/>
+      </p:bgRef>
+    </p:bg>
+    <p:spTree>
+      <p:nvGrpSpPr>
+        <p:cNvPr id="1" name=""/>
+        <p:cNvGrpSpPr/>
+        <p:nvPr/>
+      </p:nvGrpSpPr>
+      <p:grpSpPr>
+        <a:xfrm>
+          <a:off x="0" y="0"/>
+          <a:ext cx="0" cy="0"/>
+          <a:chOff x="0" y="0"/>
+          <a:chExt cx="0" cy="0"/>
+        </a:xfrm>
+      </p:grpSpPr>
+      <p:sp>
+        <p:nvSpPr>
+          <p:cNvPr id="2" name="Header Placeholder 1"/>
+          <p:cNvSpPr>
+            <a:spLocks noGrp="1"/>
+          </p:cNvSpPr>
+          <p:nvPr>
+            <p:ph type="hdr" sz="quarter"/>
+          </p:nvPr>
+        </p:nvSpPr>
+        <p:spPr>
+          <a:xfrm>
+            <a:off x="0" y="0"/>
+            <a:ext cx="2971800" cy="458788"/>
+          </a:xfrm>
+          <a:prstGeom prst="rect">
+            <a:avLst/>
+          </a:prstGeom>
+        </p:spPr>
+        <p:txBody>
+          <a:bodyPr vert="horz" lIns="91440" tIns="45720" rIns="91440" bIns="45720" rtlCol="0"/>
+          <a:lstStyle>
+            <a:lvl1pPr algn="l">
+              <a:defRPr sz="1200"/>
+            </a:lvl1pPr>
+          </a:lstStyle>
+          <a:p>
+            <a:endParaRPr lang="en-US"/>
+          </a:p>
+        </p:txBody>
+      </p:sp>
+      <p:sp>
+        <p:nvSpPr>
+          <p:cNvPr id="3" name="Date Placeholder 2"/>
+          <p:cNvSpPr>
+            <a:spLocks noGrp="1"/>
+          </p:cNvSpPr>
+          <p:nvPr>
+            <p:ph type="dt" idx="1"/>
+          </p:nvPr>
+        </p:nvSpPr>
+        <p:spPr>
+          <a:xfrm>
+            <a:off x="3884613" y="0"/>
+            <a:ext cx="2971800" cy="458788"/>
+          </a:xfrm>
+          <a:prstGeom prst="rect">
+            <a:avLst/>
+          </a:prstGeom>
+        </p:spPr>
+        <p:txBody>
+          <a:bodyPr vert="horz" lIns="91440" tIns="45720" rIns="91440" bIns="45720" rtlCol="0"/>
+          <a:lstStyle>
+            <a:lvl1pPr algn="r">
+              <a:defRPr sz="1200"/>
+            </a:lvl1pPr>
+          </a:lstStyle>
+          <a:p>
+            <a:fld id="{804BB16D-6A3A-0143-BE35-4D7955F2C534}" type="datetimeFigureOut">
+              <a:rPr lang="en-US" smtClean="0"/>
+              <a:t>6/27/23</a:t>
+            </a:fld>
+            <a:endParaRPr lang="en-US"/>
+          </a:p>
+        </p:txBody>
+      </p:sp>
+      <p:sp>
+        <p:nvSpPr>
+          <p:cNvPr id="4" name="Slide Image Placeholder 3"/>
+          <p:cNvSpPr>
+            <a:spLocks noGrp="1" noRot="1" noChangeAspect="1"/>
+          </p:cNvSpPr>
+          <p:nvPr>
+            <p:ph type="sldImg" idx="2"/>
+          </p:nvPr>
+        </p:nvSpPr>
+        <p:spPr>
+          <a:xfrm>
+            <a:off x="685800" y="1143000"/>
+            <a:ext cx="5486400" cy="3086100"/>
+          </a:xfrm>
+          <a:prstGeom prst="rect">
+            <a:avLst/>
+          </a:prstGeom>
+          <a:noFill/>
+          <a:ln w="12700">
+            <a:solidFill>
+              <a:prstClr val="black"/>
+            </a:solidFill>
+          </a:ln>
+        </p:spPr>
+        <p:txBody>
+          <a:bodyPr vert="horz" lIns="91440" tIns="45720" rIns="91440" bIns="45720" rtlCol="0" anchor="ctr"/>
+          <a:lstStyle/>
+          <a:p>
+            <a:endParaRPr lang="en-US"/>
+          </a:p>
+        </p:txBody>
+      </p:sp>
+      <p:sp>
+        <p:nvSpPr>
+          <p:cNvPr id="5" name="Notes Placeholder 4"/>
+          <p:cNvSpPr>
+            <a:spLocks noGrp="1"/>
+          </p:cNvSpPr>
+          <p:nvPr>
+            <p:ph type="body" sz="quarter" idx="3"/>
+          </p:nvPr>
+        </p:nvSpPr>
+        <p:spPr>
+          <a:xfrm>
+            <a:off x="685800" y="4400550"/>
+            <a:ext cx="5486400" cy="3600450"/>
+          </a:xfrm>
+          <a:prstGeom prst="rect">
+            <a:avLst/>
+          </a:prstGeom>
+        </p:spPr>
+        <p:txBody>
+          <a:bodyPr vert="horz" lIns="91440" tIns="45720" rIns="91440" bIns="45720" rtlCol="0"/>
+          <a:lstStyle/>
+          <a:p>
+            <a:pPr lvl="0"/>
+            <a:r>
+              <a:rPr lang="en-US"/>
+              <a:t>Click to edit Master text styles</a:t>
+            </a:r>
+          </a:p>
+          <a:p>
+            <a:pPr lvl="1"/>
+            <a:r>
+              <a:rPr lang="en-US"/>
+              <a:t>Second level</a:t>
+            </a:r>
+          </a:p>
+          <a:p>
+            <a:pPr lvl="2"/>
+            <a:r>
+              <a:rPr lang="en-US"/>
+              <a:t>Third level</a:t>
+            </a:r>
+          </a:p>
+          <a:p>
+            <a:pPr lvl="3"/>
+            <a:r>
+              <a:rPr lang="en-US"/>
+              <a:t>Fourth level</a:t>
+            </a:r>
+          </a:p>
+          <a:p>
+            <a:pPr lvl="4"/>
+            <a:r>
+              <a:rPr lang="en-US"/>
+              <a:t>Fifth level</a:t>
+            </a:r>
+          </a:p>
+        </p:txBody>
+      </p:sp>
+      <p:sp>
+        <p:nvSpPr>
+          <p:cNvPr id="6" name="Footer Placeholder 5"/>
+          <p:cNvSpPr>
+            <a:spLocks noGrp="1"/>
+          </p:cNvSpPr>
+          <p:nvPr>
+            <p:ph type="ftr" sz="quarter" idx="4"/>
+          </p:nvPr>
+        </p:nvSpPr>
+        <p:spPr>
+          <a:xfrm>
+            <a:off x="0" y="8685213"/>
+            <a:ext cx="2971800" cy="458787"/>
+          </a:xfrm>
+          <a:prstGeom prst="rect">
+            <a:avLst/>
+          </a:prstGeom>
+        </p:spPr>
+        <p:txBody>
+          <a:bodyPr vert="horz" lIns="91440" tIns="45720" rIns="91440" bIns="45720" rtlCol="0" anchor="b"/>
+          <a:lstStyle>
+            <a:lvl1pPr algn="l">
+              <a:defRPr sz="1200"/>
+            </a:lvl1pPr>
+          </a:lstStyle>
+          <a:p>
+            <a:endParaRPr lang="en-US"/>
+          </a:p>
+        </p:txBody>
+      </p:sp>
+      <p:sp>
+        <p:nvSpPr>
+          <p:cNvPr id="7" name="Slide Number Placeholder 6"/>
+          <p:cNvSpPr>
+            <a:spLocks noGrp="1"/>
+          </p:cNvSpPr>
+          <p:nvPr>
+            <p:ph type="sldNum" sz="quarter" idx="5"/>
+          </p:nvPr>
+        </p:nvSpPr>
+        <p:spPr>
+          <a:xfrm>
+            <a:off x="3884613" y="8685213"/>
+            <a:ext cx="2971800" cy="458787"/>
+          </a:xfrm>
+          <a:prstGeom prst="rect">
+            <a:avLst/>
+          </a:prstGeom>
+        </p:spPr>
+        <p:txBody>
+          <a:bodyPr vert="horz" lIns="91440" tIns="45720" rIns="91440" bIns="45720" rtlCol="0" anchor="b"/>
+          <a:lstStyle>
+            <a:lvl1pPr algn="r">
+              <a:defRPr sz="1200"/>
+            </a:lvl1pPr>
+          </a:lstStyle>
+          <a:p>
+            <a:fld id="{77E69B50-3307-884D-BB8E-972900184673}" type="slidenum">
+              <a:rPr lang="en-US" smtClean="0"/>
+              <a:t>‹#›</a:t>
+            </a:fld>
+            <a:endParaRPr lang="en-US"/>
+          </a:p>
+        </p:txBody>
+      </p:sp>
+    </p:spTree>
+    <p:extLst>
+      <p:ext uri="{BB962C8B-B14F-4D97-AF65-F5344CB8AC3E}">
+        <p14:creationId xmlns:p14="http://schemas.microsoft.com/office/powerpoint/2010/main" val="540221424"/>
+      </p:ext>
+    </p:extLst>
+  </p:cSld>
+  <p:clrMap bg1="lt1" tx1="dk1" bg2="lt2" tx2="dk2" accent1="accent1" accent2="accent2" accent3="accent3" accent4="accent4" accent5="accent5" accent6="accent6" hlink="hlink" folHlink="folHlink"/>
+  <p:notesStyle>
+    <a:lvl1pPr marL="0" algn="l" defTabSz="914400" rtl="0" eaLnBrk="1" latinLnBrk="0" hangingPunct="1">
+      <a:defRPr sz="1200" kern="1200">
+        <a:solidFill>
+          <a:schemeClr val="tx1"/>
+        </a:solidFill>
+        <a:latin typeface="+mn-lt"/>
+        <a:ea typeface="+mn-ea"/>
+        <a:cs typeface="+mn-cs"/>
+      </a:defRPr>
+    </a:lvl1pPr>
+    <a:lvl2pPr marL="457200" algn="l" defTabSz="914400" rtl="0" eaLnBrk="1" latinLnBrk="0" hangingPunct="1">
+      <a:defRPr sz="1200" kern="1200">
+        <a:solidFill>
+          <a:schemeClr val="tx1"/>
+        </a:solidFill>
+        <a:latin typeface="+mn-lt"/>
+        <a:ea typeface="+mn-ea"/>
+        <a:cs typeface="+mn-cs"/>
+      </a:defRPr>
+    </a:lvl2pPr>
+    <a:lvl3pPr marL="914400" algn="l" defTabSz="914400" rtl="0" eaLnBrk="1" latinLnBrk="0" hangingPunct="1">
+      <a:defRPr sz="1200" kern="1200">
+        <a:solidFill>
+          <a:schemeClr val="tx1"/>
+        </a:solidFill>
+        <a:latin typeface="+mn-lt"/>
+        <a:ea typeface="+mn-ea"/>
+        <a:cs typeface="+mn-cs"/>
+      </a:defRPr>
+    </a:lvl3pPr>
+    <a:lvl4pPr marL="1371600" algn="l" defTabSz="914400" rtl="0" eaLnBrk="1" latinLnBrk="0" hangingPunct="1">
+      <a:defRPr sz="1200" kern="1200">
+        <a:solidFill>
+          <a:schemeClr val="tx1"/>
+        </a:solidFill>
+        <a:latin typeface="+mn-lt"/>
+        <a:ea typeface="+mn-ea"/>
+        <a:cs typeface="+mn-cs"/>
+      </a:defRPr>
+    </a:lvl4pPr>
+    <a:lvl5pPr marL="1828800" algn="l" defTabSz="914400" rtl="0" eaLnBrk="1" latinLnBrk="0" hangingPunct="1">
+      <a:defRPr sz="1200" kern="1200">
+        <a:solidFill>
+          <a:schemeClr val="tx1"/>
+        </a:solidFill>
+        <a:latin typeface="+mn-lt"/>
+        <a:ea typeface="+mn-ea"/>
+        <a:cs typeface="+mn-cs"/>
+      </a:defRPr>
+    </a:lvl5pPr>
+    <a:lvl6pPr marL="2286000" algn="l" defTabSz="914400" rtl="0" eaLnBrk="1" latinLnBrk="0" hangingPunct="1">
+      <a:defRPr sz="1200" kern="1200">
+        <a:solidFill>
+          <a:schemeClr val="tx1"/>
+        </a:solidFill>
+        <a:latin typeface="+mn-lt"/>
+        <a:ea typeface="+mn-ea"/>
+        <a:cs typeface="+mn-cs"/>
+      </a:defRPr>
+    </a:lvl6pPr>
+    <a:lvl7pPr marL="2743200" algn="l" defTabSz="914400" rtl="0" eaLnBrk="1" latinLnBrk="0" hangingPunct="1">
+      <a:defRPr sz="1200" kern="1200">
+        <a:solidFill>
+          <a:schemeClr val="tx1"/>
+        </a:solidFill>
+        <a:latin typeface="+mn-lt"/>
+        <a:ea typeface="+mn-ea"/>
+        <a:cs typeface="+mn-cs"/>
+      </a:defRPr>
+    </a:lvl7pPr>
+    <a:lvl8pPr marL="3200400" algn="l" defTabSz="914400" rtl="0" eaLnBrk="1" latinLnBrk="0" hangingPunct="1">
+      <a:defRPr sz="1200" kern="1200">
+        <a:solidFill>
+          <a:schemeClr val="tx1"/>
+        </a:solidFill>
+        <a:latin typeface="+mn-lt"/>
+        <a:ea typeface="+mn-ea"/>
+        <a:cs typeface="+mn-cs"/>
+      </a:defRPr>
+    </a:lvl8pPr>
+    <a:lvl9pPr marL="3657600" algn="l" defTabSz="914400" rtl="0" eaLnBrk="1" latinLnBrk="0" hangingPunct="1">
+      <a:defRPr sz="1200" kern="1200">
+        <a:solidFill>
+          <a:schemeClr val="tx1"/>
+        </a:solidFill>
+        <a:latin typeface="+mn-lt"/>
+        <a:ea typeface="+mn-ea"/>
+        <a:cs typeface="+mn-cs"/>
+      </a:defRPr>
+    </a:lvl9pPr>
+  </p:notesStyle>
+</p:notesMaster>
+</file>
+
+<file path=ppt/notesSlides/notesSlide1.xml><?xml version="1.0" encoding="utf-8"?>
+<p:notes xmlns:a="http://schemas.openxmlformats.org/drawingml/2006/main" xmlns:r="http://schemas.openxmlformats.org/officeDocument/2006/relationships" xmlns:p="http://schemas.openxmlformats.org/presentationml/2006/main" showMasterSp="0" showMasterPhAnim="0">
+  <p:cSld>
+    <p:spTree>
+      <p:nvGrpSpPr>
+        <p:cNvPr id="1" name="Shape 92"/>
+        <p:cNvGrpSpPr/>
+        <p:nvPr/>
+      </p:nvGrpSpPr>
+      <p:grpSpPr>
+        <a:xfrm>
+          <a:off x="0" y="0"/>
+          <a:ext cx="0" cy="0"/>
+          <a:chOff x="0" y="0"/>
+          <a:chExt cx="0" cy="0"/>
+        </a:xfrm>
+      </p:grpSpPr>
+      <p:sp>
+        <p:nvSpPr>
+          <p:cNvPr id="93" name="Google Shape;93;p3:notes"/>
+          <p:cNvSpPr txBox="1">
+            <a:spLocks noGrp="1"/>
+          </p:cNvSpPr>
+          <p:nvPr>
+            <p:ph type="body" idx="1"/>
+          </p:nvPr>
+        </p:nvSpPr>
+        <p:spPr>
+          <a:xfrm>
+            <a:off x="685800" y="4343400"/>
+            <a:ext cx="5486400" cy="4114800"/>
+          </a:xfrm>
+          <a:prstGeom prst="rect">
+            <a:avLst/>
+          </a:prstGeom>
+        </p:spPr>
+        <p:txBody>
+          <a:bodyPr spcFirstLastPara="1" wrap="square" lIns="91425" tIns="91425" rIns="91425" bIns="91425" anchor="t" anchorCtr="0">
+            <a:noAutofit/>
+          </a:bodyPr>
+          <a:lstStyle/>
+          <a:p>
+            <a:pPr marL="0" lvl="0" indent="0" algn="l" rtl="0">
+              <a:spcBef>
+                <a:spcPts val="0"/>
+              </a:spcBef>
+              <a:spcAft>
+                <a:spcPts val="0"/>
+              </a:spcAft>
+              <a:buNone/>
+            </a:pPr>
+            <a:endParaRPr/>
+          </a:p>
+        </p:txBody>
+      </p:sp>
+      <p:sp>
+        <p:nvSpPr>
+          <p:cNvPr id="94" name="Google Shape;94;p3:notes"/>
+          <p:cNvSpPr>
+            <a:spLocks noGrp="1" noRot="1" noChangeAspect="1"/>
+          </p:cNvSpPr>
+          <p:nvPr>
+            <p:ph type="sldImg" idx="2"/>
+          </p:nvPr>
+        </p:nvSpPr>
+        <p:spPr>
+          <a:xfrm>
+            <a:off x="381000" y="685800"/>
+            <a:ext cx="6096000" cy="3429000"/>
+          </a:xfrm>
+          <a:custGeom>
+            <a:avLst/>
+            <a:gdLst/>
+            <a:ahLst/>
+            <a:cxnLst/>
+            <a:rect l="l" t="t" r="r" b="b"/>
+            <a:pathLst>
+              <a:path w="120000" h="120000" extrusionOk="0">
+                <a:moveTo>
+                  <a:pt x="0" y="0"/>
+                </a:moveTo>
+                <a:lnTo>
+                  <a:pt x="120000" y="0"/>
+                </a:lnTo>
+                <a:lnTo>
+                  <a:pt x="120000" y="120000"/>
+                </a:lnTo>
+                <a:lnTo>
+                  <a:pt x="0" y="120000"/>
+                </a:lnTo>
+                <a:close/>
+              </a:path>
+            </a:pathLst>
+          </a:custGeom>
+        </p:spPr>
+      </p:sp>
+    </p:spTree>
+    <p:extLst>
+      <p:ext uri="{BB962C8B-B14F-4D97-AF65-F5344CB8AC3E}">
+        <p14:creationId xmlns:p14="http://schemas.microsoft.com/office/powerpoint/2010/main" val="151471634"/>
+      </p:ext>
+    </p:extLst>
+  </p:cSld>
+  <p:clrMapOvr>
+    <a:masterClrMapping/>
+  </p:clrMapOvr>
+</p:notes>
 </file>
 
 <file path=ppt/slideLayouts/slideLayout1.xml><?xml version="1.0" encoding="utf-8"?>
@@ -3467,6 +3929,175 @@
           <p:cNvPr id="2" name="Title 1">
             <a:extLst>
               <a:ext uri="{FF2B5EF4-FFF2-40B4-BE49-F238E27FC236}">
+                <a16:creationId xmlns:a16="http://schemas.microsoft.com/office/drawing/2014/main" id="{F0FE4CED-74EF-CDDB-F4DD-A43B484847CE}"/>
+              </a:ext>
+            </a:extLst>
+          </p:cNvPr>
+          <p:cNvSpPr>
+            <a:spLocks noGrp="1"/>
+          </p:cNvSpPr>
+          <p:nvPr>
+            <p:ph type="title"/>
+          </p:nvPr>
+        </p:nvSpPr>
+        <p:spPr/>
+        <p:txBody>
+          <a:bodyPr/>
+          <a:lstStyle/>
+          <a:p>
+            <a:r>
+              <a:rPr lang="en-US" dirty="0"/>
+              <a:t>Conflicts 🦇👻🕸️🎃🐈‍⬛</a:t>
+            </a:r>
+          </a:p>
+        </p:txBody>
+      </p:sp>
+      <p:sp>
+        <p:nvSpPr>
+          <p:cNvPr id="3" name="Content Placeholder 2">
+            <a:extLst>
+              <a:ext uri="{FF2B5EF4-FFF2-40B4-BE49-F238E27FC236}">
+                <a16:creationId xmlns:a16="http://schemas.microsoft.com/office/drawing/2014/main" id="{73D94D35-15FD-B246-E34D-51E345E449A3}"/>
+              </a:ext>
+            </a:extLst>
+          </p:cNvPr>
+          <p:cNvSpPr>
+            <a:spLocks noGrp="1"/>
+          </p:cNvSpPr>
+          <p:nvPr>
+            <p:ph idx="1"/>
+          </p:nvPr>
+        </p:nvSpPr>
+        <p:spPr/>
+        <p:txBody>
+          <a:bodyPr>
+            <a:normAutofit fontScale="92500" lnSpcReduction="20000"/>
+          </a:bodyPr>
+          <a:lstStyle/>
+          <a:p>
+            <a:r>
+              <a:rPr lang="en-US" dirty="0"/>
+              <a:t>When two commits edit the same parts of the code</a:t>
+            </a:r>
+          </a:p>
+          <a:p>
+            <a:pPr lvl="1"/>
+            <a:r>
+              <a:rPr lang="en-US" dirty="0"/>
+              <a:t>Git doesn’t know how to code, can only merge commits when non-overlapping</a:t>
+            </a:r>
+          </a:p>
+          <a:p>
+            <a:r>
+              <a:rPr lang="en-US" dirty="0"/>
+              <a:t>Git push will not work if it creates a conflict – you must pull and fix</a:t>
+            </a:r>
+          </a:p>
+          <a:p>
+            <a:r>
+              <a:rPr lang="en-US" dirty="0"/>
+              <a:t>Git pull will not work if you edited a file (but have not made a commit with those new changes) and try to pull commits that also edit the same file</a:t>
+            </a:r>
+          </a:p>
+          <a:p>
+            <a:r>
+              <a:rPr lang="en-US" dirty="0"/>
+              <a:t>General system to follow:</a:t>
+            </a:r>
+          </a:p>
+          <a:p>
+            <a:pPr marL="914400" lvl="1" indent="-457200">
+              <a:buFont typeface="+mj-lt"/>
+              <a:buAutoNum type="arabicPeriod"/>
+            </a:pPr>
+            <a:r>
+              <a:rPr lang="en-US" dirty="0"/>
+              <a:t>Make changes to your files</a:t>
+            </a:r>
+          </a:p>
+          <a:p>
+            <a:pPr marL="914400" lvl="1" indent="-457200">
+              <a:buFont typeface="+mj-lt"/>
+              <a:buAutoNum type="arabicPeriod"/>
+            </a:pPr>
+            <a:r>
+              <a:rPr lang="en-US" dirty="0"/>
+              <a:t>Make commits for those changes</a:t>
+            </a:r>
+          </a:p>
+          <a:p>
+            <a:pPr marL="914400" lvl="1" indent="-457200">
+              <a:buFont typeface="+mj-lt"/>
+              <a:buAutoNum type="arabicPeriod"/>
+            </a:pPr>
+            <a:r>
+              <a:rPr lang="en-US" dirty="0"/>
+              <a:t>git pull</a:t>
+            </a:r>
+          </a:p>
+          <a:p>
+            <a:pPr marL="914400" lvl="1" indent="-457200">
+              <a:buFont typeface="+mj-lt"/>
+              <a:buAutoNum type="arabicPeriod"/>
+            </a:pPr>
+            <a:r>
+              <a:rPr lang="en-US" dirty="0"/>
+              <a:t>Fix any conflicts if needed</a:t>
+            </a:r>
+          </a:p>
+          <a:p>
+            <a:pPr marL="914400" lvl="1" indent="-457200">
+              <a:buFont typeface="+mj-lt"/>
+              <a:buAutoNum type="arabicPeriod"/>
+            </a:pPr>
+            <a:r>
+              <a:rPr lang="en-US" dirty="0"/>
+              <a:t>git push</a:t>
+            </a:r>
+          </a:p>
+          <a:p>
+            <a:r>
+              <a:rPr lang="en-US" dirty="0"/>
+              <a:t>Demo: conflict in ASTRON 441 repo</a:t>
+            </a:r>
+          </a:p>
+        </p:txBody>
+      </p:sp>
+    </p:spTree>
+    <p:extLst>
+      <p:ext uri="{BB962C8B-B14F-4D97-AF65-F5344CB8AC3E}">
+        <p14:creationId xmlns:p14="http://schemas.microsoft.com/office/powerpoint/2010/main" val="2398338530"/>
+      </p:ext>
+    </p:extLst>
+  </p:cSld>
+  <p:clrMapOvr>
+    <a:masterClrMapping/>
+  </p:clrMapOvr>
+</p:sld>
+</file>
+
+<file path=ppt/slides/slide11.xml><?xml version="1.0" encoding="utf-8"?>
+<p:sld xmlns:a="http://schemas.openxmlformats.org/drawingml/2006/main" xmlns:r="http://schemas.openxmlformats.org/officeDocument/2006/relationships" xmlns:p="http://schemas.openxmlformats.org/presentationml/2006/main">
+  <p:cSld>
+    <p:spTree>
+      <p:nvGrpSpPr>
+        <p:cNvPr id="1" name=""/>
+        <p:cNvGrpSpPr/>
+        <p:nvPr/>
+      </p:nvGrpSpPr>
+      <p:grpSpPr>
+        <a:xfrm>
+          <a:off x="0" y="0"/>
+          <a:ext cx="0" cy="0"/>
+          <a:chOff x="0" y="0"/>
+          <a:chExt cx="0" cy="0"/>
+        </a:xfrm>
+      </p:grpSpPr>
+      <p:sp>
+        <p:nvSpPr>
+          <p:cNvPr id="2" name="Title 1">
+            <a:extLst>
+              <a:ext uri="{FF2B5EF4-FFF2-40B4-BE49-F238E27FC236}">
                 <a16:creationId xmlns:a16="http://schemas.microsoft.com/office/drawing/2014/main" id="{F3AFE6F6-2783-3670-1B02-57C096A21F27}"/>
               </a:ext>
             </a:extLst>
@@ -3583,7 +4214,7 @@
 </p:sld>
 </file>
 
-<file path=ppt/slides/slide11.xml><?xml version="1.0" encoding="utf-8"?>
+<file path=ppt/slides/slide12.xml><?xml version="1.0" encoding="utf-8"?>
 <p:sld xmlns:a="http://schemas.openxmlformats.org/drawingml/2006/main" xmlns:r="http://schemas.openxmlformats.org/officeDocument/2006/relationships" xmlns:p="http://schemas.openxmlformats.org/presentationml/2006/main">
   <p:cSld>
     <p:spTree>
@@ -3878,7 +4509,7 @@
           <a:p>
             <a:r>
               <a:rPr lang="en-US" dirty="0"/>
-              <a:t>My recommendation: Use source control any time you are programming, even if it is just for yourself (and not just code!) </a:t>
+              <a:t>Our recommendation: Use source control any time you are programming, even if it is just for yourself (and not just code!) </a:t>
             </a:r>
           </a:p>
         </p:txBody>
@@ -4041,7 +4672,7 @@
           <p:cNvPr id="2" name="Title 1">
             <a:extLst>
               <a:ext uri="{FF2B5EF4-FFF2-40B4-BE49-F238E27FC236}">
-                <a16:creationId xmlns:a16="http://schemas.microsoft.com/office/drawing/2014/main" id="{1240C5CA-6EB0-AE24-029C-24DBECC45A1C}"/>
+                <a16:creationId xmlns:a16="http://schemas.microsoft.com/office/drawing/2014/main" id="{63BC65CB-CE34-7921-710D-43A849AFE70F}"/>
               </a:ext>
             </a:extLst>
           </p:cNvPr>
@@ -4059,7 +4690,7 @@
           <a:p>
             <a:r>
               <a:rPr lang="en-US" dirty="0"/>
-              <a:t>Jason’s philosophy with Git</a:t>
+              <a:t>Demo: Introduction to Git</a:t>
             </a:r>
           </a:p>
         </p:txBody>
@@ -4069,7 +4700,7 @@
           <p:cNvPr id="3" name="Content Placeholder 2">
             <a:extLst>
               <a:ext uri="{FF2B5EF4-FFF2-40B4-BE49-F238E27FC236}">
-                <a16:creationId xmlns:a16="http://schemas.microsoft.com/office/drawing/2014/main" id="{19035562-DE4B-0364-8749-3854063A4205}"/>
+                <a16:creationId xmlns:a16="http://schemas.microsoft.com/office/drawing/2014/main" id="{20B3C4B5-3F2C-9124-5614-B88120BBF446}"/>
               </a:ext>
             </a:extLst>
           </p:cNvPr>
@@ -4085,29 +4716,60 @@
           <a:bodyPr/>
           <a:lstStyle/>
           <a:p>
-            <a:r>
-              <a:rPr lang="en-US" dirty="0"/>
-              <a:t>Git has a lot of features; I use a very small subset</a:t>
-            </a:r>
-          </a:p>
-          <a:p>
-            <a:r>
-              <a:rPr lang="en-US" dirty="0"/>
-              <a:t>I try to develop straightforward workflows as to minimize the amount of git I need to understand</a:t>
-            </a:r>
-          </a:p>
-          <a:p>
-            <a:r>
-              <a:rPr lang="en-US" dirty="0"/>
-              <a:t>I found it helpful to develop a mental model of git to reason through what I need git to do in various cases (later today)</a:t>
-            </a:r>
+            <a:pPr marL="0" indent="0">
+              <a:buNone/>
+            </a:pPr>
+            <a:r>
+              <a:rPr lang="en-US" dirty="0"/>
+              <a:t>In the demo, you will learn how to:</a:t>
+            </a:r>
+          </a:p>
+          <a:p>
+            <a:pPr lvl="1"/>
+            <a:r>
+              <a:rPr lang="en-US" dirty="0"/>
+              <a:t>Make a git repository in </a:t>
+            </a:r>
+            <a:r>
+              <a:rPr lang="en-US" dirty="0" err="1"/>
+              <a:t>Github</a:t>
+            </a:r>
+            <a:r>
+              <a:rPr lang="en-US" dirty="0"/>
+              <a:t> and “clone” it to your local machine</a:t>
+            </a:r>
+          </a:p>
+          <a:p>
+            <a:pPr lvl="1"/>
+            <a:r>
+              <a:rPr lang="en-US" dirty="0"/>
+              <a:t>Add and edit files in the repo</a:t>
+            </a:r>
+          </a:p>
+          <a:p>
+            <a:pPr lvl="1"/>
+            <a:r>
+              <a:rPr lang="en-US" dirty="0"/>
+              <a:t>Resolve conflicts between the remote version and local version of your files</a:t>
+            </a:r>
+          </a:p>
+          <a:p>
+            <a:pPr lvl="1"/>
+            <a:r>
+              <a:rPr lang="en-US" dirty="0"/>
+              <a:t>Remove changes you don’t want to keep</a:t>
+            </a:r>
+          </a:p>
+          <a:p>
+            <a:pPr lvl="1"/>
+            <a:endParaRPr lang="en-US" dirty="0"/>
           </a:p>
         </p:txBody>
       </p:sp>
     </p:spTree>
     <p:extLst>
       <p:ext uri="{BB962C8B-B14F-4D97-AF65-F5344CB8AC3E}">
-        <p14:creationId xmlns:p14="http://schemas.microsoft.com/office/powerpoint/2010/main" val="1736866110"/>
+        <p14:creationId xmlns:p14="http://schemas.microsoft.com/office/powerpoint/2010/main" val="1679655103"/>
       </p:ext>
     </p:extLst>
   </p:cSld>
@@ -4122,7 +4784,7 @@
   <p:cSld>
     <p:spTree>
       <p:nvGrpSpPr>
-        <p:cNvPr id="1" name=""/>
+        <p:cNvPr id="1" name="Shape 95"/>
         <p:cNvGrpSpPr/>
         <p:nvPr/>
       </p:nvGrpSpPr>
@@ -4136,79 +4798,999 @@
       </p:grpSpPr>
       <p:sp>
         <p:nvSpPr>
-          <p:cNvPr id="2" name="Title 1">
-            <a:extLst>
-              <a:ext uri="{FF2B5EF4-FFF2-40B4-BE49-F238E27FC236}">
-                <a16:creationId xmlns:a16="http://schemas.microsoft.com/office/drawing/2014/main" id="{63BC65CB-CE34-7921-710D-43A849AFE70F}"/>
-              </a:ext>
-            </a:extLst>
-          </p:cNvPr>
-          <p:cNvSpPr>
+          <p:cNvPr id="96" name="Google Shape;96;p3"/>
+          <p:cNvSpPr txBox="1">
             <a:spLocks noGrp="1"/>
           </p:cNvSpPr>
           <p:nvPr>
             <p:ph type="title"/>
           </p:nvPr>
         </p:nvSpPr>
-        <p:spPr/>
-        <p:txBody>
-          <a:bodyPr/>
-          <a:lstStyle/>
-          <a:p>
-            <a:r>
-              <a:rPr lang="en-US" dirty="0"/>
-              <a:t>The basics of git</a:t>
-            </a:r>
-          </a:p>
-        </p:txBody>
-      </p:sp>
-      <p:sp>
-        <p:nvSpPr>
-          <p:cNvPr id="3" name="Content Placeholder 2">
-            <a:extLst>
-              <a:ext uri="{FF2B5EF4-FFF2-40B4-BE49-F238E27FC236}">
-                <a16:creationId xmlns:a16="http://schemas.microsoft.com/office/drawing/2014/main" id="{20B3C4B5-3F2C-9124-5614-B88120BBF446}"/>
-              </a:ext>
-            </a:extLst>
-          </p:cNvPr>
-          <p:cNvSpPr>
-            <a:spLocks noGrp="1"/>
-          </p:cNvSpPr>
-          <p:nvPr>
-            <p:ph idx="1"/>
-          </p:nvPr>
-        </p:nvSpPr>
-        <p:spPr/>
-        <p:txBody>
-          <a:bodyPr/>
-          <a:lstStyle/>
-          <a:p>
-            <a:r>
-              <a:rPr lang="en-US" dirty="0"/>
-              <a:t>Use git to keep track of changes</a:t>
-            </a:r>
-          </a:p>
-          <a:p>
-            <a:r>
-              <a:rPr lang="en-US" dirty="0"/>
-              <a:t>Sync changes to a remote repository</a:t>
-            </a:r>
-          </a:p>
-          <a:p>
-            <a:endParaRPr lang="en-US" dirty="0"/>
-          </a:p>
-          <a:p>
-            <a:r>
-              <a:rPr lang="en-US" dirty="0"/>
-              <a:t>We’ll use git commands from the command line today because all git GUIs will just replicate a subset of these commands</a:t>
-            </a:r>
+        <p:spPr>
+          <a:xfrm>
+            <a:off x="838200" y="365125"/>
+            <a:ext cx="10515600" cy="1325563"/>
+          </a:xfrm>
+          <a:prstGeom prst="rect">
+            <a:avLst/>
+          </a:prstGeom>
+          <a:noFill/>
+          <a:ln>
+            <a:noFill/>
+          </a:ln>
+        </p:spPr>
+        <p:txBody>
+          <a:bodyPr spcFirstLastPara="1" wrap="square" lIns="91425" tIns="45700" rIns="91425" bIns="45700" anchor="ctr" anchorCtr="0">
+            <a:normAutofit/>
+          </a:bodyPr>
+          <a:lstStyle/>
+          <a:p>
+            <a:pPr marL="0" lvl="0" indent="0" algn="l" rtl="0">
+              <a:lnSpc>
+                <a:spcPct val="90000"/>
+              </a:lnSpc>
+              <a:spcBef>
+                <a:spcPts val="0"/>
+              </a:spcBef>
+              <a:spcAft>
+                <a:spcPts val="0"/>
+              </a:spcAft>
+              <a:buClr>
+                <a:schemeClr val="dk1"/>
+              </a:buClr>
+              <a:buSzPts val="4000"/>
+              <a:buFont typeface="Calibri"/>
+              <a:buNone/>
+            </a:pPr>
+            <a:r>
+              <a:rPr lang="en-US" sz="4000" dirty="0"/>
+              <a:t>Git Commands</a:t>
+            </a:r>
+            <a:endParaRPr dirty="0"/>
+          </a:p>
+        </p:txBody>
+      </p:sp>
+      <p:sp>
+        <p:nvSpPr>
+          <p:cNvPr id="97" name="Google Shape;97;p3"/>
+          <p:cNvSpPr txBox="1">
+            <a:spLocks noGrp="1"/>
+          </p:cNvSpPr>
+          <p:nvPr>
+            <p:ph type="body" idx="1"/>
+          </p:nvPr>
+        </p:nvSpPr>
+        <p:spPr>
+          <a:xfrm>
+            <a:off x="838200" y="1825625"/>
+            <a:ext cx="5121584" cy="4351338"/>
+          </a:xfrm>
+          <a:prstGeom prst="rect">
+            <a:avLst/>
+          </a:prstGeom>
+          <a:noFill/>
+          <a:ln>
+            <a:noFill/>
+          </a:ln>
+        </p:spPr>
+        <p:txBody>
+          <a:bodyPr spcFirstLastPara="1" wrap="square" lIns="91425" tIns="45700" rIns="91425" bIns="45700" anchor="t" anchorCtr="0">
+            <a:normAutofit fontScale="92500" lnSpcReduction="10000"/>
+          </a:bodyPr>
+          <a:lstStyle/>
+          <a:p>
+            <a:pPr marL="0" lvl="0" indent="0" algn="l" rtl="0">
+              <a:lnSpc>
+                <a:spcPct val="90000"/>
+              </a:lnSpc>
+              <a:spcBef>
+                <a:spcPts val="0"/>
+              </a:spcBef>
+              <a:spcAft>
+                <a:spcPts val="0"/>
+              </a:spcAft>
+              <a:buClr>
+                <a:schemeClr val="dk1"/>
+              </a:buClr>
+              <a:buSzPct val="100000"/>
+              <a:buNone/>
+            </a:pPr>
+            <a:r>
+              <a:rPr lang="en-US" dirty="0">
+                <a:latin typeface="Courier New"/>
+                <a:ea typeface="Courier New"/>
+                <a:cs typeface="Courier New"/>
+                <a:sym typeface="Courier New"/>
+              </a:rPr>
+              <a:t>&gt; git clone [URL]</a:t>
+            </a:r>
+            <a:endParaRPr dirty="0"/>
+          </a:p>
+          <a:p>
+            <a:pPr marL="228600" lvl="0" indent="-228600" algn="l" rtl="0">
+              <a:lnSpc>
+                <a:spcPct val="90000"/>
+              </a:lnSpc>
+              <a:spcBef>
+                <a:spcPts val="1000"/>
+              </a:spcBef>
+              <a:spcAft>
+                <a:spcPts val="0"/>
+              </a:spcAft>
+              <a:buClr>
+                <a:schemeClr val="dk1"/>
+              </a:buClr>
+              <a:buSzPct val="100000"/>
+              <a:buChar char="•"/>
+            </a:pPr>
+            <a:r>
+              <a:rPr lang="en-US" dirty="0"/>
+              <a:t>Clones repo to your computer</a:t>
+            </a:r>
+            <a:endParaRPr dirty="0"/>
+          </a:p>
+          <a:p>
+            <a:pPr marL="0" lvl="0" indent="0" algn="l" rtl="0">
+              <a:lnSpc>
+                <a:spcPct val="90000"/>
+              </a:lnSpc>
+              <a:spcBef>
+                <a:spcPts val="1000"/>
+              </a:spcBef>
+              <a:spcAft>
+                <a:spcPts val="0"/>
+              </a:spcAft>
+              <a:buClr>
+                <a:schemeClr val="dk1"/>
+              </a:buClr>
+              <a:buSzPct val="100000"/>
+              <a:buNone/>
+            </a:pPr>
+            <a:r>
+              <a:rPr lang="en-US" dirty="0">
+                <a:latin typeface="Courier New"/>
+                <a:ea typeface="Courier New"/>
+                <a:cs typeface="Courier New"/>
+                <a:sym typeface="Courier New"/>
+              </a:rPr>
+              <a:t>&gt; git status</a:t>
+            </a:r>
+          </a:p>
+          <a:p>
+            <a:pPr marL="228600" lvl="0" indent="-228600" algn="l" rtl="0">
+              <a:lnSpc>
+                <a:spcPct val="90000"/>
+              </a:lnSpc>
+              <a:spcBef>
+                <a:spcPts val="1000"/>
+              </a:spcBef>
+              <a:spcAft>
+                <a:spcPts val="0"/>
+              </a:spcAft>
+              <a:buClr>
+                <a:schemeClr val="dk1"/>
+              </a:buClr>
+              <a:buSzPct val="100000"/>
+              <a:buChar char="•"/>
+            </a:pPr>
+            <a:r>
+              <a:rPr lang="en-US" dirty="0"/>
+              <a:t>Compare local and remote repo</a:t>
+            </a:r>
+          </a:p>
+          <a:p>
+            <a:pPr marL="0" lvl="0" indent="0" algn="l" rtl="0">
+              <a:lnSpc>
+                <a:spcPct val="90000"/>
+              </a:lnSpc>
+              <a:spcBef>
+                <a:spcPts val="1000"/>
+              </a:spcBef>
+              <a:spcAft>
+                <a:spcPts val="0"/>
+              </a:spcAft>
+              <a:buClr>
+                <a:schemeClr val="dk1"/>
+              </a:buClr>
+              <a:buSzPct val="100000"/>
+              <a:buNone/>
+            </a:pPr>
+            <a:r>
+              <a:rPr lang="en-US" dirty="0">
+                <a:latin typeface="Courier New"/>
+                <a:ea typeface="Courier New"/>
+                <a:cs typeface="Courier New"/>
+                <a:sym typeface="Courier New"/>
+              </a:rPr>
+              <a:t>&gt; git add [file]</a:t>
+            </a:r>
+            <a:endParaRPr dirty="0"/>
+          </a:p>
+          <a:p>
+            <a:pPr marL="228600" lvl="0" indent="-228600" algn="l" rtl="0">
+              <a:lnSpc>
+                <a:spcPct val="90000"/>
+              </a:lnSpc>
+              <a:spcBef>
+                <a:spcPts val="1000"/>
+              </a:spcBef>
+              <a:spcAft>
+                <a:spcPts val="0"/>
+              </a:spcAft>
+              <a:buClr>
+                <a:schemeClr val="dk1"/>
+              </a:buClr>
+              <a:buSzPct val="100000"/>
+              <a:buChar char="•"/>
+            </a:pPr>
+            <a:r>
+              <a:rPr lang="en-US" dirty="0"/>
+              <a:t>Adds changes from file to next commit</a:t>
+            </a:r>
+            <a:endParaRPr dirty="0"/>
+          </a:p>
+          <a:p>
+            <a:pPr marL="0" lvl="0" indent="0" algn="l" rtl="0">
+              <a:lnSpc>
+                <a:spcPct val="90000"/>
+              </a:lnSpc>
+              <a:spcBef>
+                <a:spcPts val="1000"/>
+              </a:spcBef>
+              <a:spcAft>
+                <a:spcPts val="0"/>
+              </a:spcAft>
+              <a:buClr>
+                <a:schemeClr val="dk1"/>
+              </a:buClr>
+              <a:buSzPct val="100000"/>
+              <a:buNone/>
+            </a:pPr>
+            <a:r>
+              <a:rPr lang="en-US" dirty="0">
+                <a:latin typeface="Courier New"/>
+                <a:ea typeface="Courier New"/>
+                <a:cs typeface="Courier New"/>
+                <a:sym typeface="Courier New"/>
+              </a:rPr>
+              <a:t>&gt; git commit</a:t>
+            </a:r>
+            <a:endParaRPr dirty="0"/>
+          </a:p>
+          <a:p>
+            <a:pPr marL="228600" lvl="0" indent="-228600" algn="l" rtl="0">
+              <a:lnSpc>
+                <a:spcPct val="90000"/>
+              </a:lnSpc>
+              <a:spcBef>
+                <a:spcPts val="1000"/>
+              </a:spcBef>
+              <a:spcAft>
+                <a:spcPts val="0"/>
+              </a:spcAft>
+              <a:buClr>
+                <a:schemeClr val="dk1"/>
+              </a:buClr>
+              <a:buSzPct val="100000"/>
+              <a:buChar char="•"/>
+            </a:pPr>
+            <a:r>
+              <a:rPr lang="en-US" dirty="0"/>
+              <a:t>Creates commit from staged changes</a:t>
+            </a:r>
+            <a:endParaRPr dirty="0"/>
+          </a:p>
+          <a:p>
+            <a:pPr marL="0" lvl="0" indent="0" algn="l" rtl="0">
+              <a:lnSpc>
+                <a:spcPct val="90000"/>
+              </a:lnSpc>
+              <a:spcBef>
+                <a:spcPts val="1000"/>
+              </a:spcBef>
+              <a:spcAft>
+                <a:spcPts val="0"/>
+              </a:spcAft>
+              <a:buClr>
+                <a:schemeClr val="dk1"/>
+              </a:buClr>
+              <a:buSzPct val="100000"/>
+              <a:buNone/>
+            </a:pPr>
+            <a:endParaRPr dirty="0"/>
+          </a:p>
+          <a:p>
+            <a:pPr marL="0" lvl="0" indent="0" algn="l" rtl="0">
+              <a:lnSpc>
+                <a:spcPct val="90000"/>
+              </a:lnSpc>
+              <a:spcBef>
+                <a:spcPts val="1000"/>
+              </a:spcBef>
+              <a:spcAft>
+                <a:spcPts val="0"/>
+              </a:spcAft>
+              <a:buClr>
+                <a:schemeClr val="dk1"/>
+              </a:buClr>
+              <a:buSzPct val="100000"/>
+              <a:buNone/>
+            </a:pPr>
+            <a:endParaRPr dirty="0">
+              <a:latin typeface="Courier New"/>
+              <a:ea typeface="Courier New"/>
+              <a:cs typeface="Courier New"/>
+              <a:sym typeface="Courier New"/>
+            </a:endParaRPr>
+          </a:p>
+        </p:txBody>
+      </p:sp>
+      <p:sp>
+        <p:nvSpPr>
+          <p:cNvPr id="98" name="Google Shape;98;p3"/>
+          <p:cNvSpPr txBox="1"/>
+          <p:nvPr/>
+        </p:nvSpPr>
+        <p:spPr>
+          <a:xfrm>
+            <a:off x="5708257" y="681037"/>
+            <a:ext cx="5121584" cy="5499494"/>
+          </a:xfrm>
+          <a:prstGeom prst="rect">
+            <a:avLst/>
+          </a:prstGeom>
+          <a:noFill/>
+          <a:ln>
+            <a:noFill/>
+          </a:ln>
+        </p:spPr>
+        <p:txBody>
+          <a:bodyPr spcFirstLastPara="1" wrap="square" lIns="91425" tIns="45700" rIns="91425" bIns="45700" anchor="t" anchorCtr="0">
+            <a:normAutofit fontScale="77500" lnSpcReduction="20000"/>
+          </a:bodyPr>
+          <a:lstStyle/>
+          <a:p>
+            <a:pPr marL="0" marR="0" lvl="0" indent="0" algn="l" rtl="0">
+              <a:lnSpc>
+                <a:spcPct val="90000"/>
+              </a:lnSpc>
+              <a:spcBef>
+                <a:spcPts val="0"/>
+              </a:spcBef>
+              <a:spcAft>
+                <a:spcPts val="0"/>
+              </a:spcAft>
+              <a:buClr>
+                <a:schemeClr val="dk1"/>
+              </a:buClr>
+              <a:buSzPct val="100000"/>
+              <a:buFont typeface="Arial"/>
+              <a:buNone/>
+            </a:pPr>
+            <a:r>
+              <a:rPr lang="en-US" sz="2800" b="0" i="0" u="none" strike="noStrike" cap="none" dirty="0">
+                <a:solidFill>
+                  <a:schemeClr val="dk1"/>
+                </a:solidFill>
+                <a:latin typeface="Courier New"/>
+                <a:ea typeface="Courier New"/>
+                <a:cs typeface="Courier New"/>
+                <a:sym typeface="Courier New"/>
+              </a:rPr>
+              <a:t>&gt; git push</a:t>
+            </a:r>
+            <a:endParaRPr dirty="0"/>
+          </a:p>
+          <a:p>
+            <a:pPr marL="228600" indent="-228600">
+              <a:lnSpc>
+                <a:spcPct val="90000"/>
+              </a:lnSpc>
+              <a:spcBef>
+                <a:spcPts val="1000"/>
+              </a:spcBef>
+              <a:buClr>
+                <a:schemeClr val="dk1"/>
+              </a:buClr>
+              <a:buSzPct val="100000"/>
+              <a:buFont typeface="Arial"/>
+              <a:buChar char="•"/>
+            </a:pPr>
+            <a:r>
+              <a:rPr lang="en-US" sz="2800" dirty="0">
+                <a:solidFill>
+                  <a:schemeClr val="dk1"/>
+                </a:solidFill>
+                <a:latin typeface="Calibri"/>
+                <a:ea typeface="Calibri"/>
+                <a:cs typeface="Calibri"/>
+                <a:sym typeface="Calibri"/>
+              </a:rPr>
+              <a:t>Sends new commits to remote repo</a:t>
+            </a:r>
+            <a:endParaRPr lang="en-US" sz="2800" dirty="0"/>
+          </a:p>
+          <a:p>
+            <a:pPr marL="0" marR="0" lvl="0" indent="0" algn="l" rtl="0">
+              <a:lnSpc>
+                <a:spcPct val="90000"/>
+              </a:lnSpc>
+              <a:spcBef>
+                <a:spcPts val="1000"/>
+              </a:spcBef>
+              <a:spcAft>
+                <a:spcPts val="0"/>
+              </a:spcAft>
+              <a:buClr>
+                <a:schemeClr val="dk1"/>
+              </a:buClr>
+              <a:buSzPct val="100000"/>
+              <a:buFont typeface="Arial"/>
+              <a:buNone/>
+            </a:pPr>
+            <a:r>
+              <a:rPr lang="en-US" sz="2800" b="0" i="0" u="none" strike="noStrike" cap="none" dirty="0">
+                <a:solidFill>
+                  <a:schemeClr val="dk1"/>
+                </a:solidFill>
+                <a:latin typeface="Courier New"/>
+                <a:ea typeface="Courier New"/>
+                <a:cs typeface="Courier New"/>
+                <a:sym typeface="Courier New"/>
+              </a:rPr>
+              <a:t>&gt; git pu</a:t>
+            </a:r>
+            <a:r>
+              <a:rPr lang="en-US" sz="2800" dirty="0">
+                <a:solidFill>
+                  <a:schemeClr val="dk1"/>
+                </a:solidFill>
+                <a:latin typeface="Courier New"/>
+                <a:ea typeface="Courier New"/>
+                <a:cs typeface="Courier New"/>
+                <a:sym typeface="Courier New"/>
+              </a:rPr>
+              <a:t>ll</a:t>
+            </a:r>
+          </a:p>
+          <a:p>
+            <a:pPr marL="285750" indent="-285750">
+              <a:lnSpc>
+                <a:spcPct val="90000"/>
+              </a:lnSpc>
+              <a:spcBef>
+                <a:spcPts val="1000"/>
+              </a:spcBef>
+              <a:buClr>
+                <a:schemeClr val="dk1"/>
+              </a:buClr>
+              <a:buSzPct val="100000"/>
+              <a:buFont typeface="Arial" panose="020B0604020202020204" pitchFamily="34" charset="0"/>
+              <a:buChar char="•"/>
+            </a:pPr>
+            <a:r>
+              <a:rPr lang="en-US" sz="2800" dirty="0">
+                <a:solidFill>
+                  <a:schemeClr val="dk1"/>
+                </a:solidFill>
+                <a:latin typeface="Calibri"/>
+                <a:ea typeface="Calibri"/>
+                <a:cs typeface="Calibri"/>
+                <a:sym typeface="Calibri"/>
+              </a:rPr>
+              <a:t>Grabs new commits from remote repo</a:t>
+            </a:r>
+            <a:endParaRPr dirty="0"/>
+          </a:p>
+          <a:p>
+            <a:pPr marL="0" marR="0" lvl="0" indent="0" algn="l" rtl="0">
+              <a:lnSpc>
+                <a:spcPct val="90000"/>
+              </a:lnSpc>
+              <a:spcBef>
+                <a:spcPts val="1000"/>
+              </a:spcBef>
+              <a:spcAft>
+                <a:spcPts val="0"/>
+              </a:spcAft>
+              <a:buClr>
+                <a:schemeClr val="dk1"/>
+              </a:buClr>
+              <a:buSzPct val="100000"/>
+              <a:buFont typeface="Arial"/>
+              <a:buNone/>
+            </a:pPr>
+            <a:r>
+              <a:rPr lang="en-US" sz="2800" b="0" i="0" u="none" strike="noStrike" cap="none" dirty="0">
+                <a:solidFill>
+                  <a:schemeClr val="dk1"/>
+                </a:solidFill>
+                <a:latin typeface="Courier New"/>
+                <a:ea typeface="Courier New"/>
+                <a:cs typeface="Courier New"/>
+                <a:sym typeface="Courier New"/>
+              </a:rPr>
+              <a:t>&gt; git diff [file]</a:t>
+            </a:r>
+            <a:endParaRPr dirty="0"/>
+          </a:p>
+          <a:p>
+            <a:pPr marL="228600" marR="0" lvl="0" indent="-228600" algn="l" rtl="0">
+              <a:lnSpc>
+                <a:spcPct val="90000"/>
+              </a:lnSpc>
+              <a:spcBef>
+                <a:spcPts val="1000"/>
+              </a:spcBef>
+              <a:spcAft>
+                <a:spcPts val="0"/>
+              </a:spcAft>
+              <a:buClr>
+                <a:schemeClr val="dk1"/>
+              </a:buClr>
+              <a:buSzPct val="100000"/>
+              <a:buFont typeface="Arial"/>
+              <a:buChar char="•"/>
+            </a:pPr>
+            <a:r>
+              <a:rPr lang="en-US" sz="2800" dirty="0">
+                <a:solidFill>
+                  <a:schemeClr val="dk1"/>
+                </a:solidFill>
+                <a:latin typeface="Calibri"/>
+                <a:cs typeface="Calibri"/>
+                <a:sym typeface="Calibri"/>
+              </a:rPr>
+              <a:t>Print difference between local and remote version of file</a:t>
+            </a:r>
+            <a:endParaRPr dirty="0"/>
+          </a:p>
+          <a:p>
+            <a:pPr marL="0" marR="0" lvl="0" indent="0" algn="l" rtl="0">
+              <a:lnSpc>
+                <a:spcPct val="90000"/>
+              </a:lnSpc>
+              <a:spcBef>
+                <a:spcPts val="1000"/>
+              </a:spcBef>
+              <a:spcAft>
+                <a:spcPts val="0"/>
+              </a:spcAft>
+              <a:buClr>
+                <a:schemeClr val="dk1"/>
+              </a:buClr>
+              <a:buSzPct val="100000"/>
+              <a:buFont typeface="Arial"/>
+              <a:buNone/>
+            </a:pPr>
+            <a:r>
+              <a:rPr lang="en-US" sz="2800" b="0" i="0" u="none" strike="noStrike" cap="none" dirty="0">
+                <a:solidFill>
+                  <a:schemeClr val="dk1"/>
+                </a:solidFill>
+                <a:latin typeface="Courier New"/>
+                <a:ea typeface="Courier New"/>
+                <a:cs typeface="Courier New"/>
+                <a:sym typeface="Courier New"/>
+              </a:rPr>
+              <a:t>&gt; git checkout [</a:t>
+            </a:r>
+            <a:r>
+              <a:rPr lang="en-US" sz="2800" dirty="0">
+                <a:solidFill>
+                  <a:schemeClr val="dk1"/>
+                </a:solidFill>
+                <a:latin typeface="Courier New"/>
+                <a:ea typeface="Courier New"/>
+                <a:cs typeface="Courier New"/>
+                <a:sym typeface="Courier New"/>
+              </a:rPr>
+              <a:t>file</a:t>
+            </a:r>
+            <a:r>
+              <a:rPr lang="en-US" sz="2800" b="0" i="0" u="none" strike="noStrike" cap="none" dirty="0">
+                <a:solidFill>
+                  <a:schemeClr val="dk1"/>
+                </a:solidFill>
+                <a:latin typeface="Courier New"/>
+                <a:ea typeface="Courier New"/>
+                <a:cs typeface="Courier New"/>
+                <a:sym typeface="Courier New"/>
+              </a:rPr>
+              <a:t>]</a:t>
+            </a:r>
+            <a:endParaRPr dirty="0"/>
+          </a:p>
+          <a:p>
+            <a:pPr marL="228600" marR="0" lvl="0" indent="-228600" algn="l" rtl="0">
+              <a:lnSpc>
+                <a:spcPct val="90000"/>
+              </a:lnSpc>
+              <a:spcBef>
+                <a:spcPts val="1000"/>
+              </a:spcBef>
+              <a:spcAft>
+                <a:spcPts val="0"/>
+              </a:spcAft>
+              <a:buClr>
+                <a:schemeClr val="dk1"/>
+              </a:buClr>
+              <a:buSzPct val="100000"/>
+              <a:buFont typeface="Arial"/>
+              <a:buChar char="•"/>
+            </a:pPr>
+            <a:r>
+              <a:rPr lang="en-US" sz="2800" dirty="0">
+                <a:solidFill>
+                  <a:schemeClr val="dk1"/>
+                </a:solidFill>
+                <a:latin typeface="Calibri"/>
+                <a:cs typeface="Calibri"/>
+                <a:sym typeface="Calibri"/>
+              </a:rPr>
+              <a:t>Get most recent commit version of file, overwrite any local changes</a:t>
+            </a:r>
+            <a:endParaRPr dirty="0"/>
+          </a:p>
+          <a:p>
+            <a:pPr marR="0" lvl="0" algn="l" rtl="0">
+              <a:lnSpc>
+                <a:spcPct val="90000"/>
+              </a:lnSpc>
+              <a:spcBef>
+                <a:spcPts val="1000"/>
+              </a:spcBef>
+              <a:spcAft>
+                <a:spcPts val="0"/>
+              </a:spcAft>
+              <a:buClr>
+                <a:schemeClr val="dk1"/>
+              </a:buClr>
+              <a:buSzPct val="100000"/>
+            </a:pPr>
+            <a:r>
+              <a:rPr lang="en-US" sz="2800" b="0" i="0" u="none" strike="noStrike" cap="none" dirty="0">
+                <a:solidFill>
+                  <a:schemeClr val="dk1"/>
+                </a:solidFill>
+                <a:latin typeface="Courier New"/>
+                <a:ea typeface="Courier New"/>
+                <a:cs typeface="Courier New"/>
+                <a:sym typeface="Courier New"/>
+              </a:rPr>
+              <a:t>&gt; git stash</a:t>
+            </a:r>
+            <a:endParaRPr dirty="0"/>
+          </a:p>
+          <a:p>
+            <a:pPr marL="228600" marR="0" lvl="0" indent="-228600" algn="l" rtl="0">
+              <a:lnSpc>
+                <a:spcPct val="90000"/>
+              </a:lnSpc>
+              <a:spcBef>
+                <a:spcPts val="1000"/>
+              </a:spcBef>
+              <a:spcAft>
+                <a:spcPts val="0"/>
+              </a:spcAft>
+              <a:buClr>
+                <a:schemeClr val="dk1"/>
+              </a:buClr>
+              <a:buSzPct val="100000"/>
+              <a:buFont typeface="Arial"/>
+              <a:buChar char="•"/>
+            </a:pPr>
+            <a:r>
+              <a:rPr lang="en-US" sz="2800" b="0" i="0" u="none" strike="noStrike" cap="none" dirty="0">
+                <a:solidFill>
+                  <a:schemeClr val="dk1"/>
+                </a:solidFill>
+                <a:latin typeface="Calibri"/>
+                <a:ea typeface="Calibri"/>
+                <a:cs typeface="Calibri"/>
+                <a:sym typeface="Calibri"/>
+              </a:rPr>
+              <a:t>Save a copy of local changes, but not as a commit (allows you to update loca</a:t>
+            </a:r>
+            <a:r>
+              <a:rPr lang="en-US" sz="2800" dirty="0">
+                <a:solidFill>
+                  <a:schemeClr val="dk1"/>
+                </a:solidFill>
+                <a:latin typeface="Calibri"/>
+                <a:ea typeface="Calibri"/>
+                <a:cs typeface="Calibri"/>
+                <a:sym typeface="Calibri"/>
+              </a:rPr>
+              <a:t>l repo from remote)</a:t>
+            </a:r>
+          </a:p>
+          <a:p>
+            <a:pPr>
+              <a:lnSpc>
+                <a:spcPct val="90000"/>
+              </a:lnSpc>
+              <a:spcBef>
+                <a:spcPts val="1000"/>
+              </a:spcBef>
+              <a:buClr>
+                <a:schemeClr val="dk1"/>
+              </a:buClr>
+              <a:buSzPct val="100000"/>
+            </a:pPr>
+            <a:r>
+              <a:rPr lang="en-US" sz="2800" dirty="0">
+                <a:solidFill>
+                  <a:schemeClr val="dk1"/>
+                </a:solidFill>
+                <a:latin typeface="Courier New"/>
+                <a:ea typeface="Courier New"/>
+                <a:cs typeface="Courier New"/>
+                <a:sym typeface="Courier New"/>
+              </a:rPr>
+              <a:t>&gt; git stash apply</a:t>
+            </a:r>
+          </a:p>
+          <a:p>
+            <a:pPr marL="457200" indent="-457200">
+              <a:lnSpc>
+                <a:spcPct val="90000"/>
+              </a:lnSpc>
+              <a:spcBef>
+                <a:spcPts val="1000"/>
+              </a:spcBef>
+              <a:buClr>
+                <a:schemeClr val="dk1"/>
+              </a:buClr>
+              <a:buSzPct val="100000"/>
+              <a:buFont typeface="Arial" panose="020B0604020202020204" pitchFamily="34" charset="0"/>
+              <a:buChar char="•"/>
+            </a:pPr>
+            <a:r>
+              <a:rPr lang="en-US" sz="2800" dirty="0">
+                <a:solidFill>
+                  <a:schemeClr val="dk1"/>
+                </a:solidFill>
+                <a:latin typeface="Calibri"/>
+                <a:ea typeface="Calibri"/>
+                <a:cs typeface="Calibri"/>
+                <a:sym typeface="Calibri"/>
+              </a:rPr>
+              <a:t>Add back local changes to files that were previously stashed away</a:t>
+            </a:r>
+          </a:p>
+          <a:p>
+            <a:pPr>
+              <a:lnSpc>
+                <a:spcPct val="90000"/>
+              </a:lnSpc>
+              <a:spcBef>
+                <a:spcPts val="1000"/>
+              </a:spcBef>
+              <a:buClr>
+                <a:schemeClr val="dk1"/>
+              </a:buClr>
+              <a:buSzPct val="100000"/>
+            </a:pPr>
+            <a:endParaRPr lang="en-US" sz="2800" dirty="0">
+              <a:solidFill>
+                <a:schemeClr val="dk1"/>
+              </a:solidFill>
+              <a:latin typeface="Courier New"/>
+              <a:ea typeface="Courier New"/>
+              <a:cs typeface="Courier New"/>
+              <a:sym typeface="Courier New"/>
+            </a:endParaRPr>
+          </a:p>
+          <a:p>
+            <a:pPr>
+              <a:lnSpc>
+                <a:spcPct val="90000"/>
+              </a:lnSpc>
+              <a:spcBef>
+                <a:spcPts val="1000"/>
+              </a:spcBef>
+              <a:buClr>
+                <a:schemeClr val="dk1"/>
+              </a:buClr>
+              <a:buSzPct val="100000"/>
+            </a:pPr>
+            <a:endParaRPr lang="en-US" sz="2800" dirty="0"/>
+          </a:p>
+          <a:p>
+            <a:pPr marR="0" lvl="0" algn="l" rtl="0">
+              <a:lnSpc>
+                <a:spcPct val="90000"/>
+              </a:lnSpc>
+              <a:spcBef>
+                <a:spcPts val="1000"/>
+              </a:spcBef>
+              <a:spcAft>
+                <a:spcPts val="0"/>
+              </a:spcAft>
+              <a:buClr>
+                <a:schemeClr val="dk1"/>
+              </a:buClr>
+              <a:buSzPct val="100000"/>
+            </a:pPr>
+            <a:endParaRPr sz="2800" b="0" i="0" u="none" strike="noStrike" cap="none" dirty="0">
+              <a:solidFill>
+                <a:schemeClr val="dk1"/>
+              </a:solidFill>
+              <a:latin typeface="Courier New"/>
+              <a:ea typeface="Courier New"/>
+              <a:cs typeface="Courier New"/>
+              <a:sym typeface="Courier New"/>
+            </a:endParaRPr>
+          </a:p>
+          <a:p>
+            <a:pPr marL="228600" marR="0" lvl="0" indent="-64135" algn="l" rtl="0">
+              <a:lnSpc>
+                <a:spcPct val="90000"/>
+              </a:lnSpc>
+              <a:spcBef>
+                <a:spcPts val="1000"/>
+              </a:spcBef>
+              <a:spcAft>
+                <a:spcPts val="0"/>
+              </a:spcAft>
+              <a:buClr>
+                <a:schemeClr val="dk1"/>
+              </a:buClr>
+              <a:buSzPct val="100000"/>
+              <a:buFont typeface="Arial"/>
+              <a:buNone/>
+            </a:pPr>
+            <a:endParaRPr sz="2800" b="0" i="0" u="none" strike="noStrike" cap="none" dirty="0">
+              <a:solidFill>
+                <a:schemeClr val="dk1"/>
+              </a:solidFill>
+              <a:latin typeface="Courier New"/>
+              <a:ea typeface="Courier New"/>
+              <a:cs typeface="Courier New"/>
+              <a:sym typeface="Courier New"/>
+            </a:endParaRPr>
+          </a:p>
+          <a:p>
+            <a:pPr marL="228600" marR="0" lvl="0" indent="-64135" algn="l" rtl="0">
+              <a:lnSpc>
+                <a:spcPct val="90000"/>
+              </a:lnSpc>
+              <a:spcBef>
+                <a:spcPts val="1000"/>
+              </a:spcBef>
+              <a:spcAft>
+                <a:spcPts val="0"/>
+              </a:spcAft>
+              <a:buClr>
+                <a:schemeClr val="dk1"/>
+              </a:buClr>
+              <a:buSzPct val="100000"/>
+              <a:buFont typeface="Arial"/>
+              <a:buNone/>
+            </a:pPr>
+            <a:endParaRPr sz="2800" b="0" i="0" u="none" strike="noStrike" cap="none" dirty="0">
+              <a:solidFill>
+                <a:schemeClr val="dk1"/>
+              </a:solidFill>
+              <a:latin typeface="Calibri"/>
+              <a:ea typeface="Calibri"/>
+              <a:cs typeface="Calibri"/>
+              <a:sym typeface="Calibri"/>
+            </a:endParaRPr>
+          </a:p>
+          <a:p>
+            <a:pPr marL="228600" marR="0" lvl="0" indent="-64135" algn="l" rtl="0">
+              <a:lnSpc>
+                <a:spcPct val="90000"/>
+              </a:lnSpc>
+              <a:spcBef>
+                <a:spcPts val="1000"/>
+              </a:spcBef>
+              <a:spcAft>
+                <a:spcPts val="0"/>
+              </a:spcAft>
+              <a:buClr>
+                <a:schemeClr val="dk1"/>
+              </a:buClr>
+              <a:buSzPct val="100000"/>
+              <a:buFont typeface="Arial"/>
+              <a:buNone/>
+            </a:pPr>
+            <a:endParaRPr sz="2800" b="0" i="0" u="none" strike="noStrike" cap="none" dirty="0">
+              <a:solidFill>
+                <a:schemeClr val="dk1"/>
+              </a:solidFill>
+              <a:latin typeface="Courier New"/>
+              <a:ea typeface="Courier New"/>
+              <a:cs typeface="Courier New"/>
+              <a:sym typeface="Courier New"/>
+            </a:endParaRPr>
+          </a:p>
+          <a:p>
+            <a:pPr marL="0" marR="0" lvl="0" indent="0" algn="l" rtl="0">
+              <a:lnSpc>
+                <a:spcPct val="90000"/>
+              </a:lnSpc>
+              <a:spcBef>
+                <a:spcPts val="1000"/>
+              </a:spcBef>
+              <a:spcAft>
+                <a:spcPts val="0"/>
+              </a:spcAft>
+              <a:buClr>
+                <a:schemeClr val="dk1"/>
+              </a:buClr>
+              <a:buSzPct val="100000"/>
+              <a:buFont typeface="Arial"/>
+              <a:buNone/>
+            </a:pPr>
+            <a:endParaRPr sz="2800" b="0" i="0" u="none" strike="noStrike" cap="none" dirty="0">
+              <a:solidFill>
+                <a:schemeClr val="dk1"/>
+              </a:solidFill>
+              <a:latin typeface="Courier New"/>
+              <a:ea typeface="Courier New"/>
+              <a:cs typeface="Courier New"/>
+              <a:sym typeface="Courier New"/>
+            </a:endParaRPr>
+          </a:p>
+        </p:txBody>
+      </p:sp>
+      <p:sp>
+        <p:nvSpPr>
+          <p:cNvPr id="99" name="Google Shape;99;p3"/>
+          <p:cNvSpPr txBox="1"/>
+          <p:nvPr/>
+        </p:nvSpPr>
+        <p:spPr>
+          <a:xfrm>
+            <a:off x="1776201" y="6311900"/>
+            <a:ext cx="9006435" cy="369332"/>
+          </a:xfrm>
+          <a:prstGeom prst="rect">
+            <a:avLst/>
+          </a:prstGeom>
+          <a:noFill/>
+          <a:ln>
+            <a:noFill/>
+          </a:ln>
+        </p:spPr>
+        <p:txBody>
+          <a:bodyPr spcFirstLastPara="1" wrap="square" lIns="91425" tIns="45700" rIns="91425" bIns="45700" anchor="t" anchorCtr="0">
+            <a:spAutoFit/>
+          </a:bodyPr>
+          <a:lstStyle/>
+          <a:p>
+            <a:pPr marL="0" marR="0" lvl="0" indent="0" algn="l" rtl="0">
+              <a:spcBef>
+                <a:spcPts val="0"/>
+              </a:spcBef>
+              <a:spcAft>
+                <a:spcPts val="0"/>
+              </a:spcAft>
+              <a:buNone/>
+            </a:pPr>
+            <a:r>
+              <a:rPr lang="en-US" sz="1800" b="0" i="0" u="none" strike="noStrike" cap="none">
+                <a:solidFill>
+                  <a:schemeClr val="dk1"/>
+                </a:solidFill>
+                <a:latin typeface="Calibri"/>
+                <a:ea typeface="Calibri"/>
+                <a:cs typeface="Calibri"/>
+                <a:sym typeface="Calibri"/>
+              </a:rPr>
+              <a:t>There are a lot of “Git Cheatsheets” online if you want a summary of more commands!</a:t>
+            </a:r>
+            <a:endParaRPr/>
           </a:p>
         </p:txBody>
       </p:sp>
     </p:spTree>
     <p:extLst>
       <p:ext uri="{BB962C8B-B14F-4D97-AF65-F5344CB8AC3E}">
-        <p14:creationId xmlns:p14="http://schemas.microsoft.com/office/powerpoint/2010/main" val="1679655103"/>
+        <p14:creationId xmlns:p14="http://schemas.microsoft.com/office/powerpoint/2010/main" val="4193908186"/>
       </p:ext>
     </p:extLst>
   </p:cSld>
@@ -4237,182 +5819,35 @@
       </p:grpSpPr>
       <p:sp>
         <p:nvSpPr>
-          <p:cNvPr id="2" name="Title 1">
-            <a:extLst>
-              <a:ext uri="{FF2B5EF4-FFF2-40B4-BE49-F238E27FC236}">
-                <a16:creationId xmlns:a16="http://schemas.microsoft.com/office/drawing/2014/main" id="{7DA995A0-7D81-8A77-527A-26682F18C71E}"/>
-              </a:ext>
-            </a:extLst>
-          </p:cNvPr>
-          <p:cNvSpPr>
-            <a:spLocks noGrp="1"/>
-          </p:cNvSpPr>
-          <p:nvPr>
-            <p:ph type="title"/>
+          <p:cNvPr id="3" name="Subtitle 2">
+            <a:extLst>
+              <a:ext uri="{FF2B5EF4-FFF2-40B4-BE49-F238E27FC236}">
+                <a16:creationId xmlns:a16="http://schemas.microsoft.com/office/drawing/2014/main" id="{6C5F78F2-9940-2C4A-BABD-92D65F58BC9F}"/>
+              </a:ext>
+            </a:extLst>
+          </p:cNvPr>
+          <p:cNvSpPr>
+            <a:spLocks noGrp="1"/>
+          </p:cNvSpPr>
+          <p:nvPr>
+            <p:ph type="subTitle" idx="1"/>
           </p:nvPr>
         </p:nvSpPr>
         <p:spPr>
           <a:xfrm>
-            <a:off x="838200" y="345669"/>
-            <a:ext cx="10515600" cy="1325563"/>
+            <a:off x="1524000" y="3018378"/>
+            <a:ext cx="9144000" cy="590583"/>
           </a:xfrm>
         </p:spPr>
         <p:txBody>
-          <a:bodyPr/>
-          <a:lstStyle/>
-          <a:p>
-            <a:r>
-              <a:rPr lang="en-US" dirty="0"/>
-              <a:t>Making a git repository</a:t>
-            </a:r>
-          </a:p>
-        </p:txBody>
-      </p:sp>
-      <p:sp>
-        <p:nvSpPr>
-          <p:cNvPr id="3" name="Content Placeholder 2">
-            <a:extLst>
-              <a:ext uri="{FF2B5EF4-FFF2-40B4-BE49-F238E27FC236}">
-                <a16:creationId xmlns:a16="http://schemas.microsoft.com/office/drawing/2014/main" id="{34766EF4-1769-E832-8F8F-80BD24DEFDD1}"/>
-              </a:ext>
-            </a:extLst>
-          </p:cNvPr>
-          <p:cNvSpPr>
-            <a:spLocks noGrp="1"/>
-          </p:cNvSpPr>
-          <p:nvPr>
-            <p:ph idx="1"/>
-          </p:nvPr>
-        </p:nvSpPr>
-        <p:spPr/>
-        <p:txBody>
           <a:bodyPr>
-            <a:normAutofit fontScale="92500" lnSpcReduction="10000"/>
+            <a:noAutofit/>
           </a:bodyPr>
           <a:lstStyle/>
           <a:p>
             <a:r>
-              <a:rPr lang="en-US" dirty="0"/>
-              <a:t>Git repo: any folder with a .git folder inside of it</a:t>
-            </a:r>
-          </a:p>
-          <a:p>
-            <a:r>
-              <a:rPr lang="en-US" dirty="0">
-                <a:latin typeface="Courier New" panose="02070309020205020404" pitchFamily="49" charset="0"/>
-                <a:cs typeface="Courier New" panose="02070309020205020404" pitchFamily="49" charset="0"/>
-              </a:rPr>
-              <a:t>git </a:t>
-            </a:r>
-            <a:r>
-              <a:rPr lang="en-US" dirty="0" err="1">
-                <a:latin typeface="Courier New" panose="02070309020205020404" pitchFamily="49" charset="0"/>
-                <a:cs typeface="Courier New" panose="02070309020205020404" pitchFamily="49" charset="0"/>
-              </a:rPr>
-              <a:t>init</a:t>
-            </a:r>
-            <a:endParaRPr lang="en-US" dirty="0">
-              <a:latin typeface="Courier New" panose="02070309020205020404" pitchFamily="49" charset="0"/>
-              <a:cs typeface="Courier New" panose="02070309020205020404" pitchFamily="49" charset="0"/>
-            </a:endParaRPr>
-          </a:p>
-          <a:p>
-            <a:pPr lvl="1"/>
-            <a:r>
-              <a:rPr lang="en-US" dirty="0"/>
-              <a:t>Turns the folder you are in into a git repo (by making the .git folder) with zero commits</a:t>
-            </a:r>
-          </a:p>
-          <a:p>
-            <a:r>
-              <a:rPr lang="en-US" dirty="0">
-                <a:latin typeface="Courier New" panose="02070309020205020404" pitchFamily="49" charset="0"/>
-                <a:cs typeface="Courier New" panose="02070309020205020404" pitchFamily="49" charset="0"/>
-              </a:rPr>
-              <a:t>git clone </a:t>
-            </a:r>
-            <a:r>
-              <a:rPr lang="en-US" dirty="0" err="1">
-                <a:latin typeface="Courier New" panose="02070309020205020404" pitchFamily="49" charset="0"/>
-                <a:cs typeface="Courier New" panose="02070309020205020404" pitchFamily="49" charset="0"/>
-              </a:rPr>
-              <a:t>url</a:t>
-            </a:r>
-            <a:endParaRPr lang="en-US" dirty="0">
-              <a:latin typeface="Courier New" panose="02070309020205020404" pitchFamily="49" charset="0"/>
-              <a:cs typeface="Courier New" panose="02070309020205020404" pitchFamily="49" charset="0"/>
-            </a:endParaRPr>
-          </a:p>
-          <a:p>
-            <a:pPr lvl="1"/>
-            <a:r>
-              <a:rPr lang="en-US" dirty="0"/>
-              <a:t>Downloads a repository from a </a:t>
-            </a:r>
-            <a:r>
-              <a:rPr lang="en-US" dirty="0" err="1"/>
-              <a:t>url</a:t>
-            </a:r>
-            <a:r>
-              <a:rPr lang="en-US" dirty="0"/>
-              <a:t> (e.g., the one from </a:t>
-            </a:r>
-            <a:r>
-              <a:rPr lang="en-US" dirty="0" err="1"/>
-              <a:t>Github</a:t>
-            </a:r>
-            <a:r>
-              <a:rPr lang="en-US" dirty="0"/>
-              <a:t>)</a:t>
-            </a:r>
-          </a:p>
-          <a:p>
-            <a:pPr lvl="1"/>
-            <a:r>
-              <a:rPr lang="en-US" dirty="0"/>
-              <a:t>Generally, I do this: I make a new repo on </a:t>
-            </a:r>
-            <a:r>
-              <a:rPr lang="en-US" dirty="0" err="1"/>
-              <a:t>Github</a:t>
-            </a:r>
-            <a:r>
-              <a:rPr lang="en-US" dirty="0"/>
-              <a:t> and then download it</a:t>
-            </a:r>
-          </a:p>
-          <a:p>
-            <a:pPr lvl="1"/>
-            <a:r>
-              <a:rPr lang="en-US" dirty="0"/>
-              <a:t>I recommend always to use the HTTPS </a:t>
-            </a:r>
-            <a:r>
-              <a:rPr lang="en-US" dirty="0" err="1"/>
-              <a:t>url</a:t>
-            </a:r>
-            <a:endParaRPr lang="en-US" dirty="0"/>
-          </a:p>
-          <a:p>
-            <a:r>
-              <a:rPr lang="en-US" dirty="0">
-                <a:latin typeface="Courier New" panose="02070309020205020404" pitchFamily="49" charset="0"/>
-                <a:cs typeface="Courier New" panose="02070309020205020404" pitchFamily="49" charset="0"/>
-              </a:rPr>
-              <a:t>git status</a:t>
-            </a:r>
-          </a:p>
-          <a:p>
-            <a:pPr lvl="1"/>
-            <a:r>
-              <a:rPr lang="en-US" dirty="0"/>
-              <a:t>Gives you the state of your current repository</a:t>
-            </a:r>
-          </a:p>
-          <a:p>
-            <a:r>
-              <a:rPr lang="en-US" dirty="0"/>
-              <a:t>Demo: download ASTRON441 repo </a:t>
+              <a:rPr lang="en-US" sz="4400" dirty="0"/>
+              <a:t>Extra Slides</a:t>
             </a:r>
           </a:p>
         </p:txBody>
@@ -4420,7 +5855,7 @@
     </p:spTree>
     <p:extLst>
       <p:ext uri="{BB962C8B-B14F-4D97-AF65-F5344CB8AC3E}">
-        <p14:creationId xmlns:p14="http://schemas.microsoft.com/office/powerpoint/2010/main" val="2312617071"/>
+        <p14:creationId xmlns:p14="http://schemas.microsoft.com/office/powerpoint/2010/main" val="2693998670"/>
       </p:ext>
     </p:extLst>
   </p:cSld>
@@ -4452,7 +5887,7 @@
           <p:cNvPr id="2" name="Title 1">
             <a:extLst>
               <a:ext uri="{FF2B5EF4-FFF2-40B4-BE49-F238E27FC236}">
-                <a16:creationId xmlns:a16="http://schemas.microsoft.com/office/drawing/2014/main" id="{6721159F-77E5-493A-E297-F8BB52122654}"/>
+                <a16:creationId xmlns:a16="http://schemas.microsoft.com/office/drawing/2014/main" id="{7DA995A0-7D81-8A77-527A-26682F18C71E}"/>
               </a:ext>
             </a:extLst>
           </p:cNvPr>
@@ -4463,117 +5898,168 @@
             <p:ph type="title"/>
           </p:nvPr>
         </p:nvSpPr>
+        <p:spPr>
+          <a:xfrm>
+            <a:off x="838200" y="345669"/>
+            <a:ext cx="10515600" cy="1325563"/>
+          </a:xfrm>
+        </p:spPr>
+        <p:txBody>
+          <a:bodyPr/>
+          <a:lstStyle/>
+          <a:p>
+            <a:r>
+              <a:rPr lang="en-US" dirty="0"/>
+              <a:t>Making a git repository</a:t>
+            </a:r>
+          </a:p>
+        </p:txBody>
+      </p:sp>
+      <p:sp>
+        <p:nvSpPr>
+          <p:cNvPr id="3" name="Content Placeholder 2">
+            <a:extLst>
+              <a:ext uri="{FF2B5EF4-FFF2-40B4-BE49-F238E27FC236}">
+                <a16:creationId xmlns:a16="http://schemas.microsoft.com/office/drawing/2014/main" id="{34766EF4-1769-E832-8F8F-80BD24DEFDD1}"/>
+              </a:ext>
+            </a:extLst>
+          </p:cNvPr>
+          <p:cNvSpPr>
+            <a:spLocks noGrp="1"/>
+          </p:cNvSpPr>
+          <p:nvPr>
+            <p:ph idx="1"/>
+          </p:nvPr>
+        </p:nvSpPr>
         <p:spPr/>
         <p:txBody>
-          <a:bodyPr/>
-          <a:lstStyle/>
-          <a:p>
-            <a:r>
-              <a:rPr lang="en-US" dirty="0"/>
-              <a:t>Making a set of changes</a:t>
-            </a:r>
-          </a:p>
-        </p:txBody>
-      </p:sp>
-      <p:sp>
-        <p:nvSpPr>
-          <p:cNvPr id="3" name="Content Placeholder 2">
-            <a:extLst>
-              <a:ext uri="{FF2B5EF4-FFF2-40B4-BE49-F238E27FC236}">
-                <a16:creationId xmlns:a16="http://schemas.microsoft.com/office/drawing/2014/main" id="{0E4FD279-0326-8F4D-724A-7652DD7E8F28}"/>
-              </a:ext>
-            </a:extLst>
-          </p:cNvPr>
-          <p:cNvSpPr>
-            <a:spLocks noGrp="1"/>
-          </p:cNvSpPr>
-          <p:nvPr>
-            <p:ph idx="1"/>
-          </p:nvPr>
-        </p:nvSpPr>
-        <p:spPr/>
-        <p:txBody>
           <a:bodyPr>
-            <a:normAutofit lnSpcReduction="10000"/>
+            <a:normAutofit fontScale="92500" lnSpcReduction="10000"/>
           </a:bodyPr>
           <a:lstStyle/>
           <a:p>
             <a:r>
               <a:rPr lang="en-US" dirty="0"/>
-              <a:t>A commit is a set of changes made to the repository</a:t>
-            </a:r>
-          </a:p>
-          <a:p>
-            <a:r>
-              <a:rPr lang="en-US" dirty="0"/>
-              <a:t>A history of changes is defined by the sequence of commits</a:t>
-            </a:r>
-          </a:p>
-          <a:p>
-            <a:r>
-              <a:rPr lang="en-US" dirty="0"/>
-              <a:t>How to make a commit</a:t>
-            </a:r>
-          </a:p>
-          <a:p>
-            <a:pPr lvl="1"/>
+              <a:t>Git repo: any folder with a .git folder inside of it</a:t>
+            </a:r>
+          </a:p>
+          <a:p>
             <a:r>
               <a:rPr lang="en-US" dirty="0">
                 <a:latin typeface="Courier New" panose="02070309020205020404" pitchFamily="49" charset="0"/>
                 <a:cs typeface="Courier New" panose="02070309020205020404" pitchFamily="49" charset="0"/>
               </a:rPr>
-              <a:t>git add [file]</a:t>
-            </a:r>
-          </a:p>
-          <a:p>
-            <a:pPr lvl="2"/>
-            <a:r>
-              <a:rPr lang="en-US" dirty="0"/>
-              <a:t>Adds any new changes from [file] to the next commit</a:t>
-            </a:r>
-          </a:p>
-          <a:p>
-            <a:pPr lvl="2"/>
-            <a:r>
-              <a:rPr lang="en-US" dirty="0"/>
-              <a:t>Can be run multiple times (even on the same file)</a:t>
-            </a:r>
+              <a:t>git </a:t>
+            </a:r>
+            <a:r>
+              <a:rPr lang="en-US" dirty="0" err="1">
+                <a:latin typeface="Courier New" panose="02070309020205020404" pitchFamily="49" charset="0"/>
+                <a:cs typeface="Courier New" panose="02070309020205020404" pitchFamily="49" charset="0"/>
+              </a:rPr>
+              <a:t>init</a:t>
+            </a:r>
+            <a:endParaRPr lang="en-US" dirty="0">
+              <a:latin typeface="Courier New" panose="02070309020205020404" pitchFamily="49" charset="0"/>
+              <a:cs typeface="Courier New" panose="02070309020205020404" pitchFamily="49" charset="0"/>
+            </a:endParaRPr>
           </a:p>
           <a:p>
             <a:pPr lvl="1"/>
+            <a:r>
+              <a:rPr lang="en-US" dirty="0"/>
+              <a:t>Turns the folder you are in into a git repo (by making the .git folder) with zero commits</a:t>
+            </a:r>
+          </a:p>
+          <a:p>
             <a:r>
               <a:rPr lang="en-US" dirty="0">
                 <a:latin typeface="Courier New" panose="02070309020205020404" pitchFamily="49" charset="0"/>
                 <a:cs typeface="Courier New" panose="02070309020205020404" pitchFamily="49" charset="0"/>
               </a:rPr>
-              <a:t>git commit –m “[description]”</a:t>
-            </a:r>
-          </a:p>
-          <a:p>
-            <a:pPr lvl="2"/>
-            <a:r>
-              <a:rPr lang="en-US" dirty="0"/>
-              <a:t>Makes a new commit that consists of all the added changes </a:t>
-            </a:r>
-          </a:p>
-          <a:p>
-            <a:pPr lvl="2"/>
-            <a:r>
-              <a:rPr lang="en-US" dirty="0"/>
-              <a:t>Description should be a short phrase that summarizes the commits changes</a:t>
-            </a:r>
-          </a:p>
-          <a:p>
-            <a:pPr lvl="2"/>
-            <a:r>
-              <a:rPr lang="en-US" dirty="0"/>
-              <a:t>Commits are free, so try to make commits small and modular</a:t>
-            </a:r>
-          </a:p>
-          <a:p>
-            <a:r>
-              <a:rPr lang="en-US" dirty="0"/>
-              <a:t>Demo: make change to ASTRON 441 repo</a:t>
+              <a:t>git clone </a:t>
+            </a:r>
+            <a:r>
+              <a:rPr lang="en-US" dirty="0" err="1">
+                <a:latin typeface="Courier New" panose="02070309020205020404" pitchFamily="49" charset="0"/>
+                <a:cs typeface="Courier New" panose="02070309020205020404" pitchFamily="49" charset="0"/>
+              </a:rPr>
+              <a:t>url</a:t>
+            </a:r>
+            <a:endParaRPr lang="en-US" dirty="0">
+              <a:latin typeface="Courier New" panose="02070309020205020404" pitchFamily="49" charset="0"/>
+              <a:cs typeface="Courier New" panose="02070309020205020404" pitchFamily="49" charset="0"/>
+            </a:endParaRPr>
+          </a:p>
+          <a:p>
+            <a:pPr lvl="1"/>
+            <a:r>
+              <a:rPr lang="en-US" dirty="0"/>
+              <a:t>Downloads a repository from a </a:t>
+            </a:r>
+            <a:r>
+              <a:rPr lang="en-US" dirty="0" err="1"/>
+              <a:t>url</a:t>
+            </a:r>
+            <a:r>
+              <a:rPr lang="en-US" dirty="0"/>
+              <a:t> (e.g., the one from </a:t>
+            </a:r>
+            <a:r>
+              <a:rPr lang="en-US" dirty="0" err="1"/>
+              <a:t>Github</a:t>
+            </a:r>
+            <a:r>
+              <a:rPr lang="en-US" dirty="0"/>
+              <a:t>)</a:t>
+            </a:r>
+          </a:p>
+          <a:p>
+            <a:pPr lvl="1"/>
+            <a:r>
+              <a:rPr lang="en-US" dirty="0"/>
+              <a:t>Generally, I do this: I make a new repo on </a:t>
+            </a:r>
+            <a:r>
+              <a:rPr lang="en-US" dirty="0" err="1"/>
+              <a:t>Github</a:t>
+            </a:r>
+            <a:r>
+              <a:rPr lang="en-US" dirty="0"/>
+              <a:t> and then download it</a:t>
+            </a:r>
+          </a:p>
+          <a:p>
+            <a:pPr lvl="1"/>
+            <a:r>
+              <a:rPr lang="en-US" dirty="0"/>
+              <a:t>I recommend always to use the HTTPS </a:t>
+            </a:r>
+            <a:r>
+              <a:rPr lang="en-US" dirty="0" err="1"/>
+              <a:t>url</a:t>
+            </a:r>
+            <a:endParaRPr lang="en-US" dirty="0"/>
+          </a:p>
+          <a:p>
+            <a:r>
+              <a:rPr lang="en-US" dirty="0">
+                <a:latin typeface="Courier New" panose="02070309020205020404" pitchFamily="49" charset="0"/>
+                <a:cs typeface="Courier New" panose="02070309020205020404" pitchFamily="49" charset="0"/>
+              </a:rPr>
+              <a:t>git status</a:t>
+            </a:r>
+          </a:p>
+          <a:p>
+            <a:pPr lvl="1"/>
+            <a:r>
+              <a:rPr lang="en-US" dirty="0"/>
+              <a:t>Gives you the state of your current repository</a:t>
+            </a:r>
+          </a:p>
+          <a:p>
+            <a:r>
+              <a:rPr lang="en-US" dirty="0"/>
+              <a:t>Demo: download ASTRON441 repo </a:t>
             </a:r>
           </a:p>
         </p:txBody>
@@ -4581,7 +6067,7 @@
     </p:spTree>
     <p:extLst>
       <p:ext uri="{BB962C8B-B14F-4D97-AF65-F5344CB8AC3E}">
-        <p14:creationId xmlns:p14="http://schemas.microsoft.com/office/powerpoint/2010/main" val="622458339"/>
+        <p14:creationId xmlns:p14="http://schemas.microsoft.com/office/powerpoint/2010/main" val="2312617071"/>
       </p:ext>
     </p:extLst>
   </p:cSld>
@@ -4613,7 +6099,7 @@
           <p:cNvPr id="2" name="Title 1">
             <a:extLst>
               <a:ext uri="{FF2B5EF4-FFF2-40B4-BE49-F238E27FC236}">
-                <a16:creationId xmlns:a16="http://schemas.microsoft.com/office/drawing/2014/main" id="{AE0BDEBA-3090-105B-C3EB-130C091F1868}"/>
+                <a16:creationId xmlns:a16="http://schemas.microsoft.com/office/drawing/2014/main" id="{6721159F-77E5-493A-E297-F8BB52122654}"/>
               </a:ext>
             </a:extLst>
           </p:cNvPr>
@@ -4631,7 +6117,7 @@
           <a:p>
             <a:r>
               <a:rPr lang="en-US" dirty="0"/>
-              <a:t>Synchronize Changes Online</a:t>
+              <a:t>Making a set of changes</a:t>
             </a:r>
           </a:p>
         </p:txBody>
@@ -4641,7 +6127,7 @@
           <p:cNvPr id="3" name="Content Placeholder 2">
             <a:extLst>
               <a:ext uri="{FF2B5EF4-FFF2-40B4-BE49-F238E27FC236}">
-                <a16:creationId xmlns:a16="http://schemas.microsoft.com/office/drawing/2014/main" id="{B7D9EE17-DFCA-823A-3E8C-0098933F3901}"/>
+                <a16:creationId xmlns:a16="http://schemas.microsoft.com/office/drawing/2014/main" id="{0E4FD279-0326-8F4D-724A-7652DD7E8F28}"/>
               </a:ext>
             </a:extLst>
           </p:cNvPr>
@@ -4661,82 +6147,80 @@
           <a:p>
             <a:r>
               <a:rPr lang="en-US" dirty="0"/>
-              <a:t>Need a service like </a:t>
-            </a:r>
-            <a:r>
-              <a:rPr lang="en-US" dirty="0" err="1"/>
-              <a:t>Github</a:t>
-            </a:r>
-            <a:r>
-              <a:rPr lang="en-US" dirty="0"/>
-              <a:t>, Bitbucket, </a:t>
-            </a:r>
-            <a:r>
-              <a:rPr lang="en-US" dirty="0" err="1"/>
-              <a:t>etc</a:t>
-            </a:r>
-            <a:r>
-              <a:rPr lang="en-US" dirty="0"/>
-              <a:t> to store your Git repo (remote repo)</a:t>
-            </a:r>
-          </a:p>
-          <a:p>
-            <a:r>
-              <a:rPr lang="en-US" dirty="0"/>
-              <a:t>Goal: your laptop and remote repo are consistent with commits</a:t>
+              <a:t>A commit is a set of changes made to the repository</a:t>
+            </a:r>
+          </a:p>
+          <a:p>
+            <a:r>
+              <a:rPr lang="en-US" dirty="0"/>
+              <a:t>A history of changes is defined by the sequence of commits</a:t>
+            </a:r>
+          </a:p>
+          <a:p>
+            <a:r>
+              <a:rPr lang="en-US" dirty="0"/>
+              <a:t>How to make a commit</a:t>
             </a:r>
           </a:p>
           <a:p>
             <a:pPr lvl="1"/>
-            <a:r>
-              <a:rPr lang="en-US" dirty="0"/>
-              <a:t>Git has ways of resolving conflicts, but don’t make it hard on yourself</a:t>
-            </a:r>
-          </a:p>
-          <a:p>
             <a:r>
               <a:rPr lang="en-US" dirty="0">
                 <a:latin typeface="Courier New" panose="02070309020205020404" pitchFamily="49" charset="0"/>
                 <a:cs typeface="Courier New" panose="02070309020205020404" pitchFamily="49" charset="0"/>
               </a:rPr>
-              <a:t>git push</a:t>
+              <a:t>git add [file]</a:t>
+            </a:r>
+          </a:p>
+          <a:p>
+            <a:pPr lvl="2"/>
+            <a:r>
+              <a:rPr lang="en-US" dirty="0"/>
+              <a:t>Adds any new changes from [file] to the next commit</a:t>
+            </a:r>
+          </a:p>
+          <a:p>
+            <a:pPr lvl="2"/>
+            <a:r>
+              <a:rPr lang="en-US" dirty="0"/>
+              <a:t>Can be run multiple times (even on the same file)</a:t>
             </a:r>
           </a:p>
           <a:p>
             <a:pPr lvl="1"/>
-            <a:r>
-              <a:rPr lang="en-US" dirty="0"/>
-              <a:t>Sends new commits you made to online repo</a:t>
-            </a:r>
-          </a:p>
-          <a:p>
             <a:r>
               <a:rPr lang="en-US" dirty="0">
                 <a:latin typeface="Courier New" panose="02070309020205020404" pitchFamily="49" charset="0"/>
                 <a:cs typeface="Courier New" panose="02070309020205020404" pitchFamily="49" charset="0"/>
               </a:rPr>
-              <a:t>git pull</a:t>
-            </a:r>
-          </a:p>
-          <a:p>
-            <a:pPr lvl="1"/>
-            <a:r>
-              <a:rPr lang="en-US" dirty="0"/>
-              <a:t>Grabs new commits from remote repo onto your machine (i.e. updates your download of the code)</a:t>
-            </a:r>
-          </a:p>
-          <a:p>
-            <a:r>
-              <a:rPr lang="en-US" dirty="0"/>
-              <a:t>Demo push, edit code on </a:t>
-            </a:r>
-            <a:r>
-              <a:rPr lang="en-US" dirty="0" err="1"/>
-              <a:t>Github</a:t>
-            </a:r>
-            <a:r>
-              <a:rPr lang="en-US" dirty="0"/>
-              <a:t>, and pull</a:t>
+              <a:t>git commit –m “[description]”</a:t>
+            </a:r>
+          </a:p>
+          <a:p>
+            <a:pPr lvl="2"/>
+            <a:r>
+              <a:rPr lang="en-US" dirty="0"/>
+              <a:t>Makes a new commit that consists of all the added changes </a:t>
+            </a:r>
+          </a:p>
+          <a:p>
+            <a:pPr lvl="2"/>
+            <a:r>
+              <a:rPr lang="en-US" dirty="0"/>
+              <a:t>Description should be a short phrase that summarizes the commits changes</a:t>
+            </a:r>
+          </a:p>
+          <a:p>
+            <a:pPr lvl="2"/>
+            <a:r>
+              <a:rPr lang="en-US" dirty="0"/>
+              <a:t>Commits are free, so try to make commits small and modular</a:t>
+            </a:r>
+          </a:p>
+          <a:p>
+            <a:r>
+              <a:rPr lang="en-US" dirty="0"/>
+              <a:t>Demo: make change to ASTRON 441 repo</a:t>
             </a:r>
           </a:p>
         </p:txBody>
@@ -4744,7 +6228,7 @@
     </p:spTree>
     <p:extLst>
       <p:ext uri="{BB962C8B-B14F-4D97-AF65-F5344CB8AC3E}">
-        <p14:creationId xmlns:p14="http://schemas.microsoft.com/office/powerpoint/2010/main" val="1833246874"/>
+        <p14:creationId xmlns:p14="http://schemas.microsoft.com/office/powerpoint/2010/main" val="622458339"/>
       </p:ext>
     </p:extLst>
   </p:cSld>
@@ -4776,7 +6260,7 @@
           <p:cNvPr id="2" name="Title 1">
             <a:extLst>
               <a:ext uri="{FF2B5EF4-FFF2-40B4-BE49-F238E27FC236}">
-                <a16:creationId xmlns:a16="http://schemas.microsoft.com/office/drawing/2014/main" id="{F0FE4CED-74EF-CDDB-F4DD-A43B484847CE}"/>
+                <a16:creationId xmlns:a16="http://schemas.microsoft.com/office/drawing/2014/main" id="{AE0BDEBA-3090-105B-C3EB-130C091F1868}"/>
               </a:ext>
             </a:extLst>
           </p:cNvPr>
@@ -4794,7 +6278,7 @@
           <a:p>
             <a:r>
               <a:rPr lang="en-US" dirty="0"/>
-              <a:t>Conflicts 🦇👻🕸️🎃🐈‍⬛</a:t>
+              <a:t>Synchronize Changes Online</a:t>
             </a:r>
           </a:p>
         </p:txBody>
@@ -4804,7 +6288,7 @@
           <p:cNvPr id="3" name="Content Placeholder 2">
             <a:extLst>
               <a:ext uri="{FF2B5EF4-FFF2-40B4-BE49-F238E27FC236}">
-                <a16:creationId xmlns:a16="http://schemas.microsoft.com/office/drawing/2014/main" id="{73D94D35-15FD-B246-E34D-51E345E449A3}"/>
+                <a16:creationId xmlns:a16="http://schemas.microsoft.com/office/drawing/2014/main" id="{B7D9EE17-DFCA-823A-3E8C-0098933F3901}"/>
               </a:ext>
             </a:extLst>
           </p:cNvPr>
@@ -4818,94 +6302,88 @@
         <p:spPr/>
         <p:txBody>
           <a:bodyPr>
-            <a:normAutofit fontScale="92500" lnSpcReduction="20000"/>
+            <a:normAutofit lnSpcReduction="10000"/>
           </a:bodyPr>
           <a:lstStyle/>
           <a:p>
             <a:r>
               <a:rPr lang="en-US" dirty="0"/>
-              <a:t>When two commits edit the same parts of the code</a:t>
+              <a:t>Need a service like </a:t>
+            </a:r>
+            <a:r>
+              <a:rPr lang="en-US" dirty="0" err="1"/>
+              <a:t>Github</a:t>
+            </a:r>
+            <a:r>
+              <a:rPr lang="en-US" dirty="0"/>
+              <a:t>, Bitbucket, </a:t>
+            </a:r>
+            <a:r>
+              <a:rPr lang="en-US" dirty="0" err="1"/>
+              <a:t>etc</a:t>
+            </a:r>
+            <a:r>
+              <a:rPr lang="en-US" dirty="0"/>
+              <a:t> to store your Git repo (remote repo)</a:t>
+            </a:r>
+          </a:p>
+          <a:p>
+            <a:r>
+              <a:rPr lang="en-US" dirty="0"/>
+              <a:t>Goal: your laptop and remote repo are consistent with commits</a:t>
             </a:r>
           </a:p>
           <a:p>
             <a:pPr lvl="1"/>
             <a:r>
               <a:rPr lang="en-US" dirty="0"/>
-              <a:t>Git doesn’t know how to code, can only merge commits when non-overlapping</a:t>
-            </a:r>
-          </a:p>
-          <a:p>
-            <a:r>
-              <a:rPr lang="en-US" dirty="0"/>
-              <a:t>Git push will not work if it creates a conflict – you must pull and fix</a:t>
-            </a:r>
-          </a:p>
-          <a:p>
-            <a:r>
-              <a:rPr lang="en-US" dirty="0"/>
-              <a:t>Git pull will not work if you edited a file (but have not made a commit with those new changes) and try to pull commits that also edit the same file</a:t>
-            </a:r>
-          </a:p>
-          <a:p>
-            <a:r>
-              <a:rPr lang="en-US" dirty="0"/>
-              <a:t>General system to follow:</a:t>
-            </a:r>
-          </a:p>
-          <a:p>
-            <a:pPr marL="914400" lvl="1" indent="-457200">
-              <a:buFont typeface="+mj-lt"/>
-              <a:buAutoNum type="arabicPeriod"/>
-            </a:pPr>
-            <a:r>
-              <a:rPr lang="en-US" dirty="0"/>
-              <a:t>Make changes to your files</a:t>
-            </a:r>
-          </a:p>
-          <a:p>
-            <a:pPr marL="914400" lvl="1" indent="-457200">
-              <a:buFont typeface="+mj-lt"/>
-              <a:buAutoNum type="arabicPeriod"/>
-            </a:pPr>
-            <a:r>
-              <a:rPr lang="en-US" dirty="0"/>
-              <a:t>Make commits for those changes</a:t>
-            </a:r>
-          </a:p>
-          <a:p>
-            <a:pPr marL="914400" lvl="1" indent="-457200">
-              <a:buFont typeface="+mj-lt"/>
-              <a:buAutoNum type="arabicPeriod"/>
-            </a:pPr>
-            <a:r>
-              <a:rPr lang="en-US" dirty="0"/>
+              <a:t>Git has ways of resolving conflicts, but don’t make it hard on yourself</a:t>
+            </a:r>
+          </a:p>
+          <a:p>
+            <a:r>
+              <a:rPr lang="en-US" dirty="0">
+                <a:latin typeface="Courier New" panose="02070309020205020404" pitchFamily="49" charset="0"/>
+                <a:cs typeface="Courier New" panose="02070309020205020404" pitchFamily="49" charset="0"/>
+              </a:rPr>
+              <a:t>git push</a:t>
+            </a:r>
+          </a:p>
+          <a:p>
+            <a:pPr lvl="1"/>
+            <a:r>
+              <a:rPr lang="en-US" dirty="0"/>
+              <a:t>Sends new commits you made to online repo</a:t>
+            </a:r>
+          </a:p>
+          <a:p>
+            <a:r>
+              <a:rPr lang="en-US" dirty="0">
+                <a:latin typeface="Courier New" panose="02070309020205020404" pitchFamily="49" charset="0"/>
+                <a:cs typeface="Courier New" panose="02070309020205020404" pitchFamily="49" charset="0"/>
+              </a:rPr>
               <a:t>git pull</a:t>
             </a:r>
           </a:p>
           <a:p>
-            <a:pPr marL="914400" lvl="1" indent="-457200">
-              <a:buFont typeface="+mj-lt"/>
-              <a:buAutoNum type="arabicPeriod"/>
-            </a:pPr>
-            <a:r>
-              <a:rPr lang="en-US" dirty="0"/>
-              <a:t>Fix any conflicts if needed</a:t>
-            </a:r>
-          </a:p>
-          <a:p>
-            <a:pPr marL="914400" lvl="1" indent="-457200">
-              <a:buFont typeface="+mj-lt"/>
-              <a:buAutoNum type="arabicPeriod"/>
-            </a:pPr>
-            <a:r>
-              <a:rPr lang="en-US" dirty="0"/>
-              <a:t>git push</a:t>
-            </a:r>
-          </a:p>
-          <a:p>
-            <a:r>
-              <a:rPr lang="en-US" dirty="0"/>
-              <a:t>Demo: conflict in ASTRON 441 repo</a:t>
+            <a:pPr lvl="1"/>
+            <a:r>
+              <a:rPr lang="en-US" dirty="0"/>
+              <a:t>Grabs new commits from remote repo onto your machine (i.e. updates your download of the code)</a:t>
+            </a:r>
+          </a:p>
+          <a:p>
+            <a:r>
+              <a:rPr lang="en-US" dirty="0"/>
+              <a:t>Demo push, edit code on </a:t>
+            </a:r>
+            <a:r>
+              <a:rPr lang="en-US" dirty="0" err="1"/>
+              <a:t>Github</a:t>
+            </a:r>
+            <a:r>
+              <a:rPr lang="en-US" dirty="0"/>
+              <a:t>, and pull</a:t>
             </a:r>
           </a:p>
         </p:txBody>
@@ -4913,7 +6391,7 @@
     </p:spTree>
     <p:extLst>
       <p:ext uri="{BB962C8B-B14F-4D97-AF65-F5344CB8AC3E}">
-        <p14:creationId xmlns:p14="http://schemas.microsoft.com/office/powerpoint/2010/main" val="2398338530"/>
+        <p14:creationId xmlns:p14="http://schemas.microsoft.com/office/powerpoint/2010/main" val="1833246874"/>
       </p:ext>
     </p:extLst>
   </p:cSld>
@@ -5122,4 +6600,299 @@
     </a:ext>
   </a:extLst>
 </a:theme>
+</file>
+
+<file path=ppt/theme/theme2.xml><?xml version="1.0" encoding="utf-8"?>
+<a:theme xmlns:a="http://schemas.openxmlformats.org/drawingml/2006/main" name="Office Theme">
+  <a:themeElements>
+    <a:clrScheme name="Office">
+      <a:dk1>
+        <a:sysClr val="windowText" lastClr="000000"/>
+      </a:dk1>
+      <a:lt1>
+        <a:sysClr val="window" lastClr="FFFFFF"/>
+      </a:lt1>
+      <a:dk2>
+        <a:srgbClr val="44546A"/>
+      </a:dk2>
+      <a:lt2>
+        <a:srgbClr val="E7E6E6"/>
+      </a:lt2>
+      <a:accent1>
+        <a:srgbClr val="4472C4"/>
+      </a:accent1>
+      <a:accent2>
+        <a:srgbClr val="ED7D31"/>
+      </a:accent2>
+      <a:accent3>
+        <a:srgbClr val="A5A5A5"/>
+      </a:accent3>
+      <a:accent4>
+        <a:srgbClr val="FFC000"/>
+      </a:accent4>
+      <a:accent5>
+        <a:srgbClr val="5B9BD5"/>
+      </a:accent5>
+      <a:accent6>
+        <a:srgbClr val="70AD47"/>
+      </a:accent6>
+      <a:hlink>
+        <a:srgbClr val="0563C1"/>
+      </a:hlink>
+      <a:folHlink>
+        <a:srgbClr val="954F72"/>
+      </a:folHlink>
+    </a:clrScheme>
+    <a:fontScheme name="Office">
+      <a:majorFont>
+        <a:latin typeface="Calibri Light" panose="020F0302020204030204"/>
+        <a:ea typeface=""/>
+        <a:cs typeface=""/>
+        <a:font script="Jpan" typeface="游ゴシック Light"/>
+        <a:font script="Hang" typeface="맑은 고딕"/>
+        <a:font script="Hans" typeface="等线 Light"/>
+        <a:font script="Hant" typeface="新細明體"/>
+        <a:font script="Arab" typeface="Times New Roman"/>
+        <a:font script="Hebr" typeface="Times New Roman"/>
+        <a:font script="Thai" typeface="Angsana New"/>
+        <a:font script="Ethi" typeface="Nyala"/>
+        <a:font script="Beng" typeface="Vrinda"/>
+        <a:font script="Gujr" typeface="Shruti"/>
+        <a:font script="Khmr" typeface="MoolBoran"/>
+        <a:font script="Knda" typeface="Tunga"/>
+        <a:font script="Guru" typeface="Raavi"/>
+        <a:font script="Cans" typeface="Euphemia"/>
+        <a:font script="Cher" typeface="Plantagenet Cherokee"/>
+        <a:font script="Yiii" typeface="Microsoft Yi Baiti"/>
+        <a:font script="Tibt" typeface="Microsoft Himalaya"/>
+        <a:font script="Thaa" typeface="MV Boli"/>
+        <a:font script="Deva" typeface="Mangal"/>
+        <a:font script="Telu" typeface="Gautami"/>
+        <a:font script="Taml" typeface="Latha"/>
+        <a:font script="Syrc" typeface="Estrangelo Edessa"/>
+        <a:font script="Orya" typeface="Kalinga"/>
+        <a:font script="Mlym" typeface="Kartika"/>
+        <a:font script="Laoo" typeface="DokChampa"/>
+        <a:font script="Sinh" typeface="Iskoola Pota"/>
+        <a:font script="Mong" typeface="Mongolian Baiti"/>
+        <a:font script="Viet" typeface="Times New Roman"/>
+        <a:font script="Uigh" typeface="Microsoft Uighur"/>
+        <a:font script="Geor" typeface="Sylfaen"/>
+        <a:font script="Armn" typeface="Arial"/>
+        <a:font script="Bugi" typeface="Leelawadee UI"/>
+        <a:font script="Bopo" typeface="Microsoft JhengHei"/>
+        <a:font script="Java" typeface="Javanese Text"/>
+        <a:font script="Lisu" typeface="Segoe UI"/>
+        <a:font script="Mymr" typeface="Myanmar Text"/>
+        <a:font script="Nkoo" typeface="Ebrima"/>
+        <a:font script="Olck" typeface="Nirmala UI"/>
+        <a:font script="Osma" typeface="Ebrima"/>
+        <a:font script="Phag" typeface="Phagspa"/>
+        <a:font script="Syrn" typeface="Estrangelo Edessa"/>
+        <a:font script="Syrj" typeface="Estrangelo Edessa"/>
+        <a:font script="Syre" typeface="Estrangelo Edessa"/>
+        <a:font script="Sora" typeface="Nirmala UI"/>
+        <a:font script="Tale" typeface="Microsoft Tai Le"/>
+        <a:font script="Talu" typeface="Microsoft New Tai Lue"/>
+        <a:font script="Tfng" typeface="Ebrima"/>
+      </a:majorFont>
+      <a:minorFont>
+        <a:latin typeface="Calibri" panose="020F0502020204030204"/>
+        <a:ea typeface=""/>
+        <a:cs typeface=""/>
+        <a:font script="Jpan" typeface="游ゴシック"/>
+        <a:font script="Hang" typeface="맑은 고딕"/>
+        <a:font script="Hans" typeface="等线"/>
+        <a:font script="Hant" typeface="新細明體"/>
+        <a:font script="Arab" typeface="Arial"/>
+        <a:font script="Hebr" typeface="Arial"/>
+        <a:font script="Thai" typeface="Cordia New"/>
+        <a:font script="Ethi" typeface="Nyala"/>
+        <a:font script="Beng" typeface="Vrinda"/>
+        <a:font script="Gujr" typeface="Shruti"/>
+        <a:font script="Khmr" typeface="DaunPenh"/>
+        <a:font script="Knda" typeface="Tunga"/>
+        <a:font script="Guru" typeface="Raavi"/>
+        <a:font script="Cans" typeface="Euphemia"/>
+        <a:font script="Cher" typeface="Plantagenet Cherokee"/>
+        <a:font script="Yiii" typeface="Microsoft Yi Baiti"/>
+        <a:font script="Tibt" typeface="Microsoft Himalaya"/>
+        <a:font script="Thaa" typeface="MV Boli"/>
+        <a:font script="Deva" typeface="Mangal"/>
+        <a:font script="Telu" typeface="Gautami"/>
+        <a:font script="Taml" typeface="Latha"/>
+        <a:font script="Syrc" typeface="Estrangelo Edessa"/>
+        <a:font script="Orya" typeface="Kalinga"/>
+        <a:font script="Mlym" typeface="Kartika"/>
+        <a:font script="Laoo" typeface="DokChampa"/>
+        <a:font script="Sinh" typeface="Iskoola Pota"/>
+        <a:font script="Mong" typeface="Mongolian Baiti"/>
+        <a:font script="Viet" typeface="Arial"/>
+        <a:font script="Uigh" typeface="Microsoft Uighur"/>
+        <a:font script="Geor" typeface="Sylfaen"/>
+        <a:font script="Armn" typeface="Arial"/>
+        <a:font script="Bugi" typeface="Leelawadee UI"/>
+        <a:font script="Bopo" typeface="Microsoft JhengHei"/>
+        <a:font script="Java" typeface="Javanese Text"/>
+        <a:font script="Lisu" typeface="Segoe UI"/>
+        <a:font script="Mymr" typeface="Myanmar Text"/>
+        <a:font script="Nkoo" typeface="Ebrima"/>
+        <a:font script="Olck" typeface="Nirmala UI"/>
+        <a:font script="Osma" typeface="Ebrima"/>
+        <a:font script="Phag" typeface="Phagspa"/>
+        <a:font script="Syrn" typeface="Estrangelo Edessa"/>
+        <a:font script="Syrj" typeface="Estrangelo Edessa"/>
+        <a:font script="Syre" typeface="Estrangelo Edessa"/>
+        <a:font script="Sora" typeface="Nirmala UI"/>
+        <a:font script="Tale" typeface="Microsoft Tai Le"/>
+        <a:font script="Talu" typeface="Microsoft New Tai Lue"/>
+        <a:font script="Tfng" typeface="Ebrima"/>
+      </a:minorFont>
+    </a:fontScheme>
+    <a:fmtScheme name="Office">
+      <a:fillStyleLst>
+        <a:solidFill>
+          <a:schemeClr val="phClr"/>
+        </a:solidFill>
+        <a:gradFill rotWithShape="1">
+          <a:gsLst>
+            <a:gs pos="0">
+              <a:schemeClr val="phClr">
+                <a:lumMod val="110000"/>
+                <a:satMod val="105000"/>
+                <a:tint val="67000"/>
+              </a:schemeClr>
+            </a:gs>
+            <a:gs pos="50000">
+              <a:schemeClr val="phClr">
+                <a:lumMod val="105000"/>
+                <a:satMod val="103000"/>
+                <a:tint val="73000"/>
+              </a:schemeClr>
+            </a:gs>
+            <a:gs pos="100000">
+              <a:schemeClr val="phClr">
+                <a:lumMod val="105000"/>
+                <a:satMod val="109000"/>
+                <a:tint val="81000"/>
+              </a:schemeClr>
+            </a:gs>
+          </a:gsLst>
+          <a:lin ang="5400000" scaled="0"/>
+        </a:gradFill>
+        <a:gradFill rotWithShape="1">
+          <a:gsLst>
+            <a:gs pos="0">
+              <a:schemeClr val="phClr">
+                <a:satMod val="103000"/>
+                <a:lumMod val="102000"/>
+                <a:tint val="94000"/>
+              </a:schemeClr>
+            </a:gs>
+            <a:gs pos="50000">
+              <a:schemeClr val="phClr">
+                <a:satMod val="110000"/>
+                <a:lumMod val="100000"/>
+                <a:shade val="100000"/>
+              </a:schemeClr>
+            </a:gs>
+            <a:gs pos="100000">
+              <a:schemeClr val="phClr">
+                <a:lumMod val="99000"/>
+                <a:satMod val="120000"/>
+                <a:shade val="78000"/>
+              </a:schemeClr>
+            </a:gs>
+          </a:gsLst>
+          <a:lin ang="5400000" scaled="0"/>
+        </a:gradFill>
+      </a:fillStyleLst>
+      <a:lnStyleLst>
+        <a:ln w="6350" cap="flat" cmpd="sng" algn="ctr">
+          <a:solidFill>
+            <a:schemeClr val="phClr"/>
+          </a:solidFill>
+          <a:prstDash val="solid"/>
+          <a:miter lim="800000"/>
+        </a:ln>
+        <a:ln w="12700" cap="flat" cmpd="sng" algn="ctr">
+          <a:solidFill>
+            <a:schemeClr val="phClr"/>
+          </a:solidFill>
+          <a:prstDash val="solid"/>
+          <a:miter lim="800000"/>
+        </a:ln>
+        <a:ln w="19050" cap="flat" cmpd="sng" algn="ctr">
+          <a:solidFill>
+            <a:schemeClr val="phClr"/>
+          </a:solidFill>
+          <a:prstDash val="solid"/>
+          <a:miter lim="800000"/>
+        </a:ln>
+      </a:lnStyleLst>
+      <a:effectStyleLst>
+        <a:effectStyle>
+          <a:effectLst/>
+        </a:effectStyle>
+        <a:effectStyle>
+          <a:effectLst/>
+        </a:effectStyle>
+        <a:effectStyle>
+          <a:effectLst>
+            <a:outerShdw blurRad="57150" dist="19050" dir="5400000" algn="ctr" rotWithShape="0">
+              <a:srgbClr val="000000">
+                <a:alpha val="63000"/>
+              </a:srgbClr>
+            </a:outerShdw>
+          </a:effectLst>
+        </a:effectStyle>
+      </a:effectStyleLst>
+      <a:bgFillStyleLst>
+        <a:solidFill>
+          <a:schemeClr val="phClr"/>
+        </a:solidFill>
+        <a:solidFill>
+          <a:schemeClr val="phClr">
+            <a:tint val="95000"/>
+            <a:satMod val="170000"/>
+          </a:schemeClr>
+        </a:solidFill>
+        <a:gradFill rotWithShape="1">
+          <a:gsLst>
+            <a:gs pos="0">
+              <a:schemeClr val="phClr">
+                <a:tint val="93000"/>
+                <a:satMod val="150000"/>
+                <a:shade val="98000"/>
+                <a:lumMod val="102000"/>
+              </a:schemeClr>
+            </a:gs>
+            <a:gs pos="50000">
+              <a:schemeClr val="phClr">
+                <a:tint val="98000"/>
+                <a:satMod val="130000"/>
+                <a:shade val="90000"/>
+                <a:lumMod val="103000"/>
+              </a:schemeClr>
+            </a:gs>
+            <a:gs pos="100000">
+              <a:schemeClr val="phClr">
+                <a:shade val="63000"/>
+                <a:satMod val="120000"/>
+              </a:schemeClr>
+            </a:gs>
+          </a:gsLst>
+          <a:lin ang="5400000" scaled="0"/>
+        </a:gradFill>
+      </a:bgFillStyleLst>
+    </a:fmtScheme>
+  </a:themeElements>
+  <a:objectDefaults/>
+  <a:extraClrSchemeLst/>
+  <a:extLst>
+    <a:ext uri="{05A4C25C-085E-4340-85A3-A5531E510DB2}">
+      <thm15:themeFamily xmlns:thm15="http://schemas.microsoft.com/office/thememl/2012/main" name="Office Theme" id="{62F939B6-93AF-4DB8-9C6B-D6C7DFDC589F}" vid="{4A3C46E8-61CC-4603-A589-7422A47A8E4A}"/>
+    </a:ext>
+  </a:extLst>
+</a:theme>
 </file>
</xml_diff>

<commit_message>
basic source control: positive
</commit_message>
<xml_diff>
--- a/Day1/intro_to_git.pptx
+++ b/Day1/intro_to_git.pptx
@@ -4921,8 +4921,21 @@
           <a:p>
             <a:r>
               <a:rPr lang="en-US" dirty="0"/>
-              <a:t>Primitive source control: copy the entire folder and name it “OLD_v3”</a:t>
-            </a:r>
+              <a:t>Basic source control: copy the entire folder and name it “OLD_v3”</a:t>
+            </a:r>
+          </a:p>
+          <a:p>
+            <a:pPr lvl="1"/>
+            <a:r>
+              <a:rPr lang="en-US" dirty="0"/>
+              <a:t>Better than nothing, but quickly becomes difficult to work with</a:t>
+            </a:r>
+          </a:p>
+          <a:p>
+            <a:pPr marL="457200" lvl="1" indent="0">
+              <a:buNone/>
+            </a:pPr>
+            <a:endParaRPr lang="en-US" dirty="0"/>
           </a:p>
           <a:p>
             <a:r>
@@ -4936,6 +4949,12 @@
               <a:rPr lang="en-US" dirty="0"/>
               <a:t>Good for tracking a mix of different file types</a:t>
             </a:r>
+          </a:p>
+          <a:p>
+            <a:pPr marL="457200" lvl="1" indent="0">
+              <a:buNone/>
+            </a:pPr>
+            <a:endParaRPr lang="en-US" dirty="0"/>
           </a:p>
           <a:p>
             <a:r>

</xml_diff>

<commit_message>
updates slides for 2024
</commit_message>
<xml_diff>
--- a/Day1/intro_to_git.pptx
+++ b/Day1/intro_to_git.pptx
@@ -10,12 +10,12 @@
   <p:sldIdLst>
     <p:sldId id="256" r:id="rId2"/>
     <p:sldId id="278" r:id="rId3"/>
-    <p:sldId id="257" r:id="rId4"/>
-    <p:sldId id="283" r:id="rId5"/>
-    <p:sldId id="290" r:id="rId6"/>
-    <p:sldId id="258" r:id="rId7"/>
-    <p:sldId id="291" r:id="rId8"/>
-    <p:sldId id="289" r:id="rId9"/>
+    <p:sldId id="283" r:id="rId4"/>
+    <p:sldId id="290" r:id="rId5"/>
+    <p:sldId id="258" r:id="rId6"/>
+    <p:sldId id="291" r:id="rId7"/>
+    <p:sldId id="289" r:id="rId8"/>
+    <p:sldId id="257" r:id="rId9"/>
     <p:sldId id="280" r:id="rId10"/>
     <p:sldId id="281" r:id="rId11"/>
     <p:sldId id="282" r:id="rId12"/>
@@ -210,7 +210,7 @@
           <a:p>
             <a:fld id="{804BB16D-6A3A-0143-BE35-4D7955F2C534}" type="datetimeFigureOut">
               <a:rPr lang="en-US" smtClean="0"/>
-              <a:t>7/6/23</a:t>
+              <a:t>7/11/24</a:t>
             </a:fld>
             <a:endParaRPr lang="en-US"/>
           </a:p>
@@ -733,7 +733,7 @@
           <a:p>
             <a:fld id="{34073DC1-AB27-4363-9845-555972D7C4F0}" type="datetimeFigureOut">
               <a:rPr lang="en-US" smtClean="0"/>
-              <a:t>7/6/23</a:t>
+              <a:t>7/11/24</a:t>
             </a:fld>
             <a:endParaRPr lang="en-US"/>
           </a:p>
@@ -931,7 +931,7 @@
           <a:p>
             <a:fld id="{34073DC1-AB27-4363-9845-555972D7C4F0}" type="datetimeFigureOut">
               <a:rPr lang="en-US" smtClean="0"/>
-              <a:t>7/6/23</a:t>
+              <a:t>7/11/24</a:t>
             </a:fld>
             <a:endParaRPr lang="en-US"/>
           </a:p>
@@ -1139,7 +1139,7 @@
           <a:p>
             <a:fld id="{34073DC1-AB27-4363-9845-555972D7C4F0}" type="datetimeFigureOut">
               <a:rPr lang="en-US" smtClean="0"/>
-              <a:t>7/6/23</a:t>
+              <a:t>7/11/24</a:t>
             </a:fld>
             <a:endParaRPr lang="en-US"/>
           </a:p>
@@ -1337,7 +1337,7 @@
           <a:p>
             <a:fld id="{34073DC1-AB27-4363-9845-555972D7C4F0}" type="datetimeFigureOut">
               <a:rPr lang="en-US" smtClean="0"/>
-              <a:t>7/6/23</a:t>
+              <a:t>7/11/24</a:t>
             </a:fld>
             <a:endParaRPr lang="en-US"/>
           </a:p>
@@ -1612,7 +1612,7 @@
           <a:p>
             <a:fld id="{34073DC1-AB27-4363-9845-555972D7C4F0}" type="datetimeFigureOut">
               <a:rPr lang="en-US" smtClean="0"/>
-              <a:t>7/6/23</a:t>
+              <a:t>7/11/24</a:t>
             </a:fld>
             <a:endParaRPr lang="en-US"/>
           </a:p>
@@ -1877,7 +1877,7 @@
           <a:p>
             <a:fld id="{34073DC1-AB27-4363-9845-555972D7C4F0}" type="datetimeFigureOut">
               <a:rPr lang="en-US" smtClean="0"/>
-              <a:t>7/6/23</a:t>
+              <a:t>7/11/24</a:t>
             </a:fld>
             <a:endParaRPr lang="en-US"/>
           </a:p>
@@ -2289,7 +2289,7 @@
           <a:p>
             <a:fld id="{34073DC1-AB27-4363-9845-555972D7C4F0}" type="datetimeFigureOut">
               <a:rPr lang="en-US" smtClean="0"/>
-              <a:t>7/6/23</a:t>
+              <a:t>7/11/24</a:t>
             </a:fld>
             <a:endParaRPr lang="en-US"/>
           </a:p>
@@ -2430,7 +2430,7 @@
           <a:p>
             <a:fld id="{34073DC1-AB27-4363-9845-555972D7C4F0}" type="datetimeFigureOut">
               <a:rPr lang="en-US" smtClean="0"/>
-              <a:t>7/6/23</a:t>
+              <a:t>7/11/24</a:t>
             </a:fld>
             <a:endParaRPr lang="en-US"/>
           </a:p>
@@ -2543,7 +2543,7 @@
           <a:p>
             <a:fld id="{34073DC1-AB27-4363-9845-555972D7C4F0}" type="datetimeFigureOut">
               <a:rPr lang="en-US" smtClean="0"/>
-              <a:t>7/6/23</a:t>
+              <a:t>7/11/24</a:t>
             </a:fld>
             <a:endParaRPr lang="en-US"/>
           </a:p>
@@ -2854,7 +2854,7 @@
           <a:p>
             <a:fld id="{34073DC1-AB27-4363-9845-555972D7C4F0}" type="datetimeFigureOut">
               <a:rPr lang="en-US" smtClean="0"/>
-              <a:t>7/6/23</a:t>
+              <a:t>7/11/24</a:t>
             </a:fld>
             <a:endParaRPr lang="en-US"/>
           </a:p>
@@ -3142,7 +3142,7 @@
           <a:p>
             <a:fld id="{34073DC1-AB27-4363-9845-555972D7C4F0}" type="datetimeFigureOut">
               <a:rPr lang="en-US" smtClean="0"/>
-              <a:t>7/6/23</a:t>
+              <a:t>7/11/24</a:t>
             </a:fld>
             <a:endParaRPr lang="en-US"/>
           </a:p>
@@ -3383,7 +3383,7 @@
           <a:p>
             <a:fld id="{34073DC1-AB27-4363-9845-555972D7C4F0}" type="datetimeFigureOut">
               <a:rPr lang="en-US" smtClean="0"/>
-              <a:t>7/6/23</a:t>
+              <a:t>7/11/24</a:t>
             </a:fld>
             <a:endParaRPr lang="en-US"/>
           </a:p>
@@ -3861,7 +3861,7 @@
           <a:p>
             <a:r>
               <a:rPr lang="en-US" dirty="0"/>
-              <a:t>Code/Astro 2023</a:t>
+              <a:t>Code/Astro 2024</a:t>
             </a:r>
           </a:p>
         </p:txBody>
@@ -4765,7 +4765,7 @@
           <a:p>
             <a:r>
               <a:rPr lang="en-US" dirty="0"/>
-              <a:t>Source Control</a:t>
+              <a:t>Source Control (also called Version Control)</a:t>
             </a:r>
           </a:p>
         </p:txBody>
@@ -4875,7 +4875,7 @@
           <p:cNvPr id="2" name="Title 1">
             <a:extLst>
               <a:ext uri="{FF2B5EF4-FFF2-40B4-BE49-F238E27FC236}">
-                <a16:creationId xmlns:a16="http://schemas.microsoft.com/office/drawing/2014/main" id="{A41A64AA-AA60-6931-7F7C-7E9C9B60F299}"/>
+                <a16:creationId xmlns:a16="http://schemas.microsoft.com/office/drawing/2014/main" id="{63BC65CB-CE34-7921-710D-43A849AFE70F}"/>
               </a:ext>
             </a:extLst>
           </p:cNvPr>
@@ -4893,7 +4893,7 @@
           <a:p>
             <a:r>
               <a:rPr lang="en-US" dirty="0"/>
-              <a:t>Source Control Flavors</a:t>
+              <a:t>Demo: Introduction to Git</a:t>
             </a:r>
           </a:p>
         </p:txBody>
@@ -4903,7 +4903,7 @@
           <p:cNvPr id="3" name="Content Placeholder 2">
             <a:extLst>
               <a:ext uri="{FF2B5EF4-FFF2-40B4-BE49-F238E27FC236}">
-                <a16:creationId xmlns:a16="http://schemas.microsoft.com/office/drawing/2014/main" id="{6F3182A0-CA53-2160-8E26-542204CCABD6}"/>
+                <a16:creationId xmlns:a16="http://schemas.microsoft.com/office/drawing/2014/main" id="{20B3C4B5-3F2C-9124-5614-B88120BBF446}"/>
               </a:ext>
             </a:extLst>
           </p:cNvPr>
@@ -4919,65 +4919,65 @@
           <a:bodyPr/>
           <a:lstStyle/>
           <a:p>
-            <a:r>
-              <a:rPr lang="en-US" dirty="0"/>
-              <a:t>Basic source control: copy the entire folder and name it “OLD_v3”</a:t>
+            <a:pPr marL="0" indent="0">
+              <a:buNone/>
+            </a:pPr>
+            <a:r>
+              <a:rPr lang="en-US" dirty="0"/>
+              <a:t>In the demo, you will learn how to:</a:t>
             </a:r>
           </a:p>
           <a:p>
             <a:pPr lvl="1"/>
             <a:r>
               <a:rPr lang="en-US" dirty="0"/>
-              <a:t>Better than nothing, but quickly becomes difficult to work with</a:t>
-            </a:r>
-          </a:p>
-          <a:p>
-            <a:pPr marL="457200" lvl="1" indent="0">
+              <a:t>Make a git repository in </a:t>
+            </a:r>
+            <a:r>
+              <a:rPr lang="en-US" dirty="0" err="1"/>
+              <a:t>Github</a:t>
+            </a:r>
+            <a:r>
+              <a:rPr lang="en-US" dirty="0"/>
+              <a:t> and “copy” it to your local machine</a:t>
+            </a:r>
+          </a:p>
+          <a:p>
+            <a:pPr lvl="1"/>
+            <a:r>
+              <a:rPr lang="en-US" dirty="0"/>
+              <a:t>Add and edit files in the repo</a:t>
+            </a:r>
+          </a:p>
+          <a:p>
+            <a:pPr lvl="1"/>
+            <a:r>
+              <a:rPr lang="en-US" dirty="0"/>
+              <a:t>Resolve conflicts between the remote version and local version of your files</a:t>
+            </a:r>
+          </a:p>
+          <a:p>
+            <a:pPr lvl="1"/>
+            <a:r>
+              <a:rPr lang="en-US" dirty="0"/>
+              <a:t>[If time] Remove changes you don’t want to keep</a:t>
+            </a:r>
+          </a:p>
+          <a:p>
+            <a:pPr lvl="1"/>
+            <a:endParaRPr lang="en-US" dirty="0"/>
+          </a:p>
+          <a:p>
+            <a:pPr marL="0" indent="0">
               <a:buNone/>
             </a:pPr>
-            <a:endParaRPr lang="en-US" dirty="0"/>
-          </a:p>
-          <a:p>
-            <a:r>
-              <a:rPr lang="en-US" dirty="0"/>
-              <a:t>File synchronization software: Dropbox, Google drive, other cloud storage, etc..</a:t>
+            <a:r>
+              <a:rPr lang="en-US" dirty="0"/>
+              <a:t>Try to type along with me as we walk through the demo. However, don’t worry if you get stuck! We’ll have time at the end to work on the demo in groups. </a:t>
             </a:r>
           </a:p>
           <a:p>
             <a:pPr lvl="1"/>
-            <a:r>
-              <a:rPr lang="en-US" dirty="0"/>
-              <a:t>Good for tracking a mix of different file types</a:t>
-            </a:r>
-          </a:p>
-          <a:p>
-            <a:pPr marL="457200" lvl="1" indent="0">
-              <a:buNone/>
-            </a:pPr>
-            <a:endParaRPr lang="en-US" dirty="0"/>
-          </a:p>
-          <a:p>
-            <a:r>
-              <a:rPr lang="en-US" dirty="0"/>
-              <a:t>Specific for code development: git, </a:t>
-            </a:r>
-            <a:r>
-              <a:rPr lang="en-US" dirty="0" err="1"/>
-              <a:t>svn</a:t>
-            </a:r>
-            <a:r>
-              <a:rPr lang="en-US" dirty="0"/>
-              <a:t>, mercurial, team foundation</a:t>
-            </a:r>
-          </a:p>
-          <a:p>
-            <a:pPr lvl="1"/>
-            <a:r>
-              <a:rPr lang="en-US" dirty="0"/>
-              <a:t>Git is the most popular in astronomy software development (and nearly everywhere)</a:t>
-            </a:r>
-          </a:p>
-          <a:p>
             <a:endParaRPr lang="en-US" dirty="0"/>
           </a:p>
         </p:txBody>
@@ -4985,7 +4985,7 @@
     </p:spTree>
     <p:extLst>
       <p:ext uri="{BB962C8B-B14F-4D97-AF65-F5344CB8AC3E}">
-        <p14:creationId xmlns:p14="http://schemas.microsoft.com/office/powerpoint/2010/main" val="2938757313"/>
+        <p14:creationId xmlns:p14="http://schemas.microsoft.com/office/powerpoint/2010/main" val="1679655103"/>
       </p:ext>
     </p:extLst>
   </p:cSld>
@@ -5035,148 +5035,6 @@
           <a:p>
             <a:r>
               <a:rPr lang="en-US" dirty="0"/>
-              <a:t>Demo: Introduction to Git</a:t>
-            </a:r>
-          </a:p>
-        </p:txBody>
-      </p:sp>
-      <p:sp>
-        <p:nvSpPr>
-          <p:cNvPr id="3" name="Content Placeholder 2">
-            <a:extLst>
-              <a:ext uri="{FF2B5EF4-FFF2-40B4-BE49-F238E27FC236}">
-                <a16:creationId xmlns:a16="http://schemas.microsoft.com/office/drawing/2014/main" id="{20B3C4B5-3F2C-9124-5614-B88120BBF446}"/>
-              </a:ext>
-            </a:extLst>
-          </p:cNvPr>
-          <p:cNvSpPr>
-            <a:spLocks noGrp="1"/>
-          </p:cNvSpPr>
-          <p:nvPr>
-            <p:ph idx="1"/>
-          </p:nvPr>
-        </p:nvSpPr>
-        <p:spPr/>
-        <p:txBody>
-          <a:bodyPr/>
-          <a:lstStyle/>
-          <a:p>
-            <a:pPr marL="0" indent="0">
-              <a:buNone/>
-            </a:pPr>
-            <a:r>
-              <a:rPr lang="en-US" dirty="0"/>
-              <a:t>In the demo, you will learn how to:</a:t>
-            </a:r>
-          </a:p>
-          <a:p>
-            <a:pPr lvl="1"/>
-            <a:r>
-              <a:rPr lang="en-US" dirty="0"/>
-              <a:t>Make a git repository in </a:t>
-            </a:r>
-            <a:r>
-              <a:rPr lang="en-US" dirty="0" err="1"/>
-              <a:t>Github</a:t>
-            </a:r>
-            <a:r>
-              <a:rPr lang="en-US" dirty="0"/>
-              <a:t> and “copy” it to your local machine</a:t>
-            </a:r>
-          </a:p>
-          <a:p>
-            <a:pPr lvl="1"/>
-            <a:r>
-              <a:rPr lang="en-US" dirty="0"/>
-              <a:t>Add and edit files in the repo</a:t>
-            </a:r>
-          </a:p>
-          <a:p>
-            <a:pPr lvl="1"/>
-            <a:r>
-              <a:rPr lang="en-US" dirty="0"/>
-              <a:t>Resolve conflicts between the remote version and local version of your files</a:t>
-            </a:r>
-          </a:p>
-          <a:p>
-            <a:pPr lvl="1"/>
-            <a:r>
-              <a:rPr lang="en-US" dirty="0"/>
-              <a:t>Remove changes you don’t want to keep</a:t>
-            </a:r>
-          </a:p>
-          <a:p>
-            <a:pPr lvl="1"/>
-            <a:endParaRPr lang="en-US" dirty="0"/>
-          </a:p>
-          <a:p>
-            <a:pPr marL="0" indent="0">
-              <a:buNone/>
-            </a:pPr>
-            <a:r>
-              <a:rPr lang="en-US" dirty="0"/>
-              <a:t>Try to type along with me as we walk through the demo. However, don’t worry if you get stuck! We’ll have time at the end to work on the demo in groups. </a:t>
-            </a:r>
-          </a:p>
-          <a:p>
-            <a:pPr lvl="1"/>
-            <a:endParaRPr lang="en-US" dirty="0"/>
-          </a:p>
-        </p:txBody>
-      </p:sp>
-    </p:spTree>
-    <p:extLst>
-      <p:ext uri="{BB962C8B-B14F-4D97-AF65-F5344CB8AC3E}">
-        <p14:creationId xmlns:p14="http://schemas.microsoft.com/office/powerpoint/2010/main" val="1679655103"/>
-      </p:ext>
-    </p:extLst>
-  </p:cSld>
-  <p:clrMapOvr>
-    <a:masterClrMapping/>
-  </p:clrMapOvr>
-</p:sld>
-</file>
-
-<file path=ppt/slides/slide5.xml><?xml version="1.0" encoding="utf-8"?>
-<p:sld xmlns:a="http://schemas.openxmlformats.org/drawingml/2006/main" xmlns:r="http://schemas.openxmlformats.org/officeDocument/2006/relationships" xmlns:p="http://schemas.openxmlformats.org/presentationml/2006/main">
-  <p:cSld>
-    <p:spTree>
-      <p:nvGrpSpPr>
-        <p:cNvPr id="1" name=""/>
-        <p:cNvGrpSpPr/>
-        <p:nvPr/>
-      </p:nvGrpSpPr>
-      <p:grpSpPr>
-        <a:xfrm>
-          <a:off x="0" y="0"/>
-          <a:ext cx="0" cy="0"/>
-          <a:chOff x="0" y="0"/>
-          <a:chExt cx="0" cy="0"/>
-        </a:xfrm>
-      </p:grpSpPr>
-      <p:sp>
-        <p:nvSpPr>
-          <p:cNvPr id="2" name="Title 1">
-            <a:extLst>
-              <a:ext uri="{FF2B5EF4-FFF2-40B4-BE49-F238E27FC236}">
-                <a16:creationId xmlns:a16="http://schemas.microsoft.com/office/drawing/2014/main" id="{63BC65CB-CE34-7921-710D-43A849AFE70F}"/>
-              </a:ext>
-            </a:extLst>
-          </p:cNvPr>
-          <p:cNvSpPr>
-            <a:spLocks noGrp="1"/>
-          </p:cNvSpPr>
-          <p:nvPr>
-            <p:ph type="title"/>
-          </p:nvPr>
-        </p:nvSpPr>
-        <p:spPr/>
-        <p:txBody>
-          <a:bodyPr/>
-          <a:lstStyle/>
-          <a:p>
-            <a:r>
-              <a:rPr lang="en-US" dirty="0"/>
               <a:t>Group Activity (10 mins)</a:t>
             </a:r>
           </a:p>
@@ -5253,7 +5111,7 @@
 </p:sld>
 </file>
 
-<file path=ppt/slides/slide6.xml><?xml version="1.0" encoding="utf-8"?>
+<file path=ppt/slides/slide5.xml><?xml version="1.0" encoding="utf-8"?>
 <p:sld xmlns:a="http://schemas.openxmlformats.org/drawingml/2006/main" xmlns:r="http://schemas.openxmlformats.org/officeDocument/2006/relationships" xmlns:p="http://schemas.openxmlformats.org/presentationml/2006/main">
   <p:cSld>
     <p:spTree>
@@ -6319,6 +6177,110 @@
     <p:extLst>
       <p:ext uri="{BB962C8B-B14F-4D97-AF65-F5344CB8AC3E}">
         <p14:creationId xmlns:p14="http://schemas.microsoft.com/office/powerpoint/2010/main" val="4193908186"/>
+      </p:ext>
+    </p:extLst>
+  </p:cSld>
+  <p:clrMapOvr>
+    <a:masterClrMapping/>
+  </p:clrMapOvr>
+</p:sld>
+</file>
+
+<file path=ppt/slides/slide6.xml><?xml version="1.0" encoding="utf-8"?>
+<p:sld xmlns:a="http://schemas.openxmlformats.org/drawingml/2006/main" xmlns:r="http://schemas.openxmlformats.org/officeDocument/2006/relationships" xmlns:p="http://schemas.openxmlformats.org/presentationml/2006/main">
+  <p:cSld>
+    <p:spTree>
+      <p:nvGrpSpPr>
+        <p:cNvPr id="1" name=""/>
+        <p:cNvGrpSpPr/>
+        <p:nvPr/>
+      </p:nvGrpSpPr>
+      <p:grpSpPr>
+        <a:xfrm>
+          <a:off x="0" y="0"/>
+          <a:ext cx="0" cy="0"/>
+          <a:chOff x="0" y="0"/>
+          <a:chExt cx="0" cy="0"/>
+        </a:xfrm>
+      </p:grpSpPr>
+      <p:sp>
+        <p:nvSpPr>
+          <p:cNvPr id="2" name="Title 1">
+            <a:extLst>
+              <a:ext uri="{FF2B5EF4-FFF2-40B4-BE49-F238E27FC236}">
+                <a16:creationId xmlns:a16="http://schemas.microsoft.com/office/drawing/2014/main" id="{63BC65CB-CE34-7921-710D-43A849AFE70F}"/>
+              </a:ext>
+            </a:extLst>
+          </p:cNvPr>
+          <p:cNvSpPr>
+            <a:spLocks noGrp="1"/>
+          </p:cNvSpPr>
+          <p:nvPr>
+            <p:ph type="title"/>
+          </p:nvPr>
+        </p:nvSpPr>
+        <p:spPr/>
+        <p:txBody>
+          <a:bodyPr/>
+          <a:lstStyle/>
+          <a:p>
+            <a:r>
+              <a:rPr lang="en-US" dirty="0"/>
+              <a:t>Helpful Practices To Avoid Merge Conflicts</a:t>
+            </a:r>
+          </a:p>
+        </p:txBody>
+      </p:sp>
+      <p:sp>
+        <p:nvSpPr>
+          <p:cNvPr id="3" name="Content Placeholder 2">
+            <a:extLst>
+              <a:ext uri="{FF2B5EF4-FFF2-40B4-BE49-F238E27FC236}">
+                <a16:creationId xmlns:a16="http://schemas.microsoft.com/office/drawing/2014/main" id="{20B3C4B5-3F2C-9124-5614-B88120BBF446}"/>
+              </a:ext>
+            </a:extLst>
+          </p:cNvPr>
+          <p:cNvSpPr>
+            <a:spLocks noGrp="1"/>
+          </p:cNvSpPr>
+          <p:nvPr>
+            <p:ph idx="1"/>
+          </p:nvPr>
+        </p:nvSpPr>
+        <p:spPr/>
+        <p:txBody>
+          <a:bodyPr/>
+          <a:lstStyle/>
+          <a:p>
+            <a:r>
+              <a:rPr lang="en-US" dirty="0"/>
+              <a:t>Always “git pull” from origin before working on a code</a:t>
+            </a:r>
+          </a:p>
+          <a:p>
+            <a:endParaRPr lang="en-US" dirty="0"/>
+          </a:p>
+          <a:p>
+            <a:r>
+              <a:rPr lang="en-US" dirty="0"/>
+              <a:t>”git commit” and “git push” changes early and often! The smaller units these changes are, the easier they are to work with</a:t>
+            </a:r>
+          </a:p>
+          <a:p>
+            <a:endParaRPr lang="en-US" dirty="0"/>
+          </a:p>
+          <a:p>
+            <a:r>
+              <a:rPr lang="en-US" dirty="0"/>
+              <a:t>If applicable: coordinate with collaborators as to what section of code you are working on, to avoid multiple folks working on the same area at the same time</a:t>
+            </a:r>
+          </a:p>
+        </p:txBody>
+      </p:sp>
+    </p:spTree>
+    <p:extLst>
+      <p:ext uri="{BB962C8B-B14F-4D97-AF65-F5344CB8AC3E}">
+        <p14:creationId xmlns:p14="http://schemas.microsoft.com/office/powerpoint/2010/main" val="3253428648"/>
       </p:ext>
     </p:extLst>
   </p:cSld>
@@ -6347,74 +6309,35 @@
       </p:grpSpPr>
       <p:sp>
         <p:nvSpPr>
-          <p:cNvPr id="2" name="Title 1">
-            <a:extLst>
-              <a:ext uri="{FF2B5EF4-FFF2-40B4-BE49-F238E27FC236}">
-                <a16:creationId xmlns:a16="http://schemas.microsoft.com/office/drawing/2014/main" id="{63BC65CB-CE34-7921-710D-43A849AFE70F}"/>
-              </a:ext>
-            </a:extLst>
-          </p:cNvPr>
-          <p:cNvSpPr>
-            <a:spLocks noGrp="1"/>
-          </p:cNvSpPr>
-          <p:nvPr>
-            <p:ph type="title"/>
-          </p:nvPr>
-        </p:nvSpPr>
-        <p:spPr/>
-        <p:txBody>
-          <a:bodyPr/>
-          <a:lstStyle/>
-          <a:p>
-            <a:r>
-              <a:rPr lang="en-US" dirty="0"/>
-              <a:t>Helpful Practices To Avoid Merge Conflicts</a:t>
-            </a:r>
-          </a:p>
-        </p:txBody>
-      </p:sp>
-      <p:sp>
-        <p:nvSpPr>
-          <p:cNvPr id="3" name="Content Placeholder 2">
-            <a:extLst>
-              <a:ext uri="{FF2B5EF4-FFF2-40B4-BE49-F238E27FC236}">
-                <a16:creationId xmlns:a16="http://schemas.microsoft.com/office/drawing/2014/main" id="{20B3C4B5-3F2C-9124-5614-B88120BBF446}"/>
-              </a:ext>
-            </a:extLst>
-          </p:cNvPr>
-          <p:cNvSpPr>
-            <a:spLocks noGrp="1"/>
-          </p:cNvSpPr>
-          <p:nvPr>
-            <p:ph idx="1"/>
-          </p:nvPr>
-        </p:nvSpPr>
-        <p:spPr/>
-        <p:txBody>
-          <a:bodyPr/>
-          <a:lstStyle/>
-          <a:p>
-            <a:r>
-              <a:rPr lang="en-US" dirty="0"/>
-              <a:t>Always “git pull” from origin before working on a code</a:t>
-            </a:r>
-          </a:p>
-          <a:p>
-            <a:endParaRPr lang="en-US" dirty="0"/>
-          </a:p>
-          <a:p>
-            <a:r>
-              <a:rPr lang="en-US" dirty="0"/>
-              <a:t>”git commit” and “git push” changes early and often! The smaller units these changes are, the easier they are to work with</a:t>
-            </a:r>
-          </a:p>
-          <a:p>
-            <a:endParaRPr lang="en-US" dirty="0"/>
-          </a:p>
-          <a:p>
-            <a:r>
-              <a:rPr lang="en-US" dirty="0"/>
-              <a:t>If applicable: coordinate with collaborators as to what section of code you are working on, to avoid multiple folks working on the same area at the same time</a:t>
+          <p:cNvPr id="3" name="Subtitle 2">
+            <a:extLst>
+              <a:ext uri="{FF2B5EF4-FFF2-40B4-BE49-F238E27FC236}">
+                <a16:creationId xmlns:a16="http://schemas.microsoft.com/office/drawing/2014/main" id="{6C5F78F2-9940-2C4A-BABD-92D65F58BC9F}"/>
+              </a:ext>
+            </a:extLst>
+          </p:cNvPr>
+          <p:cNvSpPr>
+            <a:spLocks noGrp="1"/>
+          </p:cNvSpPr>
+          <p:nvPr>
+            <p:ph type="subTitle" idx="1"/>
+          </p:nvPr>
+        </p:nvSpPr>
+        <p:spPr>
+          <a:xfrm>
+            <a:off x="1524000" y="3018378"/>
+            <a:ext cx="9144000" cy="590583"/>
+          </a:xfrm>
+        </p:spPr>
+        <p:txBody>
+          <a:bodyPr>
+            <a:noAutofit/>
+          </a:bodyPr>
+          <a:lstStyle/>
+          <a:p>
+            <a:r>
+              <a:rPr lang="en-US" sz="4400" dirty="0"/>
+              <a:t>Extra Slides</a:t>
             </a:r>
           </a:p>
         </p:txBody>
@@ -6422,7 +6345,7 @@
     </p:spTree>
     <p:extLst>
       <p:ext uri="{BB962C8B-B14F-4D97-AF65-F5344CB8AC3E}">
-        <p14:creationId xmlns:p14="http://schemas.microsoft.com/office/powerpoint/2010/main" val="3253428648"/>
+        <p14:creationId xmlns:p14="http://schemas.microsoft.com/office/powerpoint/2010/main" val="2693998670"/>
       </p:ext>
     </p:extLst>
   </p:cSld>
@@ -6451,43 +6374,120 @@
       </p:grpSpPr>
       <p:sp>
         <p:nvSpPr>
-          <p:cNvPr id="3" name="Subtitle 2">
-            <a:extLst>
-              <a:ext uri="{FF2B5EF4-FFF2-40B4-BE49-F238E27FC236}">
-                <a16:creationId xmlns:a16="http://schemas.microsoft.com/office/drawing/2014/main" id="{6C5F78F2-9940-2C4A-BABD-92D65F58BC9F}"/>
-              </a:ext>
-            </a:extLst>
-          </p:cNvPr>
-          <p:cNvSpPr>
-            <a:spLocks noGrp="1"/>
-          </p:cNvSpPr>
-          <p:nvPr>
-            <p:ph type="subTitle" idx="1"/>
-          </p:nvPr>
-        </p:nvSpPr>
-        <p:spPr>
-          <a:xfrm>
-            <a:off x="1524000" y="3018378"/>
-            <a:ext cx="9144000" cy="590583"/>
-          </a:xfrm>
-        </p:spPr>
-        <p:txBody>
-          <a:bodyPr>
-            <a:noAutofit/>
-          </a:bodyPr>
-          <a:lstStyle/>
-          <a:p>
-            <a:r>
-              <a:rPr lang="en-US" sz="4400" dirty="0"/>
-              <a:t>Extra Slides</a:t>
-            </a:r>
+          <p:cNvPr id="2" name="Title 1">
+            <a:extLst>
+              <a:ext uri="{FF2B5EF4-FFF2-40B4-BE49-F238E27FC236}">
+                <a16:creationId xmlns:a16="http://schemas.microsoft.com/office/drawing/2014/main" id="{A41A64AA-AA60-6931-7F7C-7E9C9B60F299}"/>
+              </a:ext>
+            </a:extLst>
+          </p:cNvPr>
+          <p:cNvSpPr>
+            <a:spLocks noGrp="1"/>
+          </p:cNvSpPr>
+          <p:nvPr>
+            <p:ph type="title"/>
+          </p:nvPr>
+        </p:nvSpPr>
+        <p:spPr/>
+        <p:txBody>
+          <a:bodyPr/>
+          <a:lstStyle/>
+          <a:p>
+            <a:r>
+              <a:rPr lang="en-US" dirty="0"/>
+              <a:t>Source Control Flavors</a:t>
+            </a:r>
+          </a:p>
+        </p:txBody>
+      </p:sp>
+      <p:sp>
+        <p:nvSpPr>
+          <p:cNvPr id="3" name="Content Placeholder 2">
+            <a:extLst>
+              <a:ext uri="{FF2B5EF4-FFF2-40B4-BE49-F238E27FC236}">
+                <a16:creationId xmlns:a16="http://schemas.microsoft.com/office/drawing/2014/main" id="{6F3182A0-CA53-2160-8E26-542204CCABD6}"/>
+              </a:ext>
+            </a:extLst>
+          </p:cNvPr>
+          <p:cNvSpPr>
+            <a:spLocks noGrp="1"/>
+          </p:cNvSpPr>
+          <p:nvPr>
+            <p:ph idx="1"/>
+          </p:nvPr>
+        </p:nvSpPr>
+        <p:spPr/>
+        <p:txBody>
+          <a:bodyPr/>
+          <a:lstStyle/>
+          <a:p>
+            <a:r>
+              <a:rPr lang="en-US" dirty="0"/>
+              <a:t>Basic source control: copy the entire folder and name it “OLD_v3”</a:t>
+            </a:r>
+          </a:p>
+          <a:p>
+            <a:pPr lvl="1"/>
+            <a:r>
+              <a:rPr lang="en-US" dirty="0"/>
+              <a:t>Better than nothing, but quickly becomes difficult to work with</a:t>
+            </a:r>
+          </a:p>
+          <a:p>
+            <a:pPr marL="457200" lvl="1" indent="0">
+              <a:buNone/>
+            </a:pPr>
+            <a:endParaRPr lang="en-US" dirty="0"/>
+          </a:p>
+          <a:p>
+            <a:r>
+              <a:rPr lang="en-US" dirty="0"/>
+              <a:t>File synchronization software: Dropbox, Google drive, other cloud storage, etc..</a:t>
+            </a:r>
+          </a:p>
+          <a:p>
+            <a:pPr lvl="1"/>
+            <a:r>
+              <a:rPr lang="en-US" dirty="0"/>
+              <a:t>Good for tracking a mix of different file types</a:t>
+            </a:r>
+          </a:p>
+          <a:p>
+            <a:pPr marL="457200" lvl="1" indent="0">
+              <a:buNone/>
+            </a:pPr>
+            <a:endParaRPr lang="en-US" dirty="0"/>
+          </a:p>
+          <a:p>
+            <a:r>
+              <a:rPr lang="en-US" dirty="0"/>
+              <a:t>Specific for code development: git, </a:t>
+            </a:r>
+            <a:r>
+              <a:rPr lang="en-US" dirty="0" err="1"/>
+              <a:t>svn</a:t>
+            </a:r>
+            <a:r>
+              <a:rPr lang="en-US" dirty="0"/>
+              <a:t>, mercurial, team foundation</a:t>
+            </a:r>
+          </a:p>
+          <a:p>
+            <a:pPr lvl="1"/>
+            <a:r>
+              <a:rPr lang="en-US" dirty="0"/>
+              <a:t>Git is the most popular in astronomy software development (and nearly everywhere)</a:t>
+            </a:r>
+          </a:p>
+          <a:p>
+            <a:endParaRPr lang="en-US" dirty="0"/>
           </a:p>
         </p:txBody>
       </p:sp>
     </p:spTree>
     <p:extLst>
       <p:ext uri="{BB962C8B-B14F-4D97-AF65-F5344CB8AC3E}">
-        <p14:creationId xmlns:p14="http://schemas.microsoft.com/office/powerpoint/2010/main" val="2693998670"/>
+        <p14:creationId xmlns:p14="http://schemas.microsoft.com/office/powerpoint/2010/main" val="2938757313"/>
       </p:ext>
     </p:extLst>
   </p:cSld>

</xml_diff>